<commit_message>
Fixed technical errors in presentation
</commit_message>
<xml_diff>
--- a/Lecture on Machine Translation, Alejandro Ciuba.pptx
+++ b/Lecture on Machine Translation, Alejandro Ciuba.pptx
@@ -1190,7 +1190,15 @@
               <a:buNone/>
             </a:pPr>
             <a:r>
-              <a:t/>
+              <a:rPr lang="en" sz="1050">
+                <a:solidFill>
+                  <a:srgbClr val="202122"/>
+                </a:solidFill>
+                <a:highlight>
+                  <a:srgbClr val="FFFFFF"/>
+                </a:highlight>
+              </a:rPr>
+              <a:t>- Perceptron is a 1 layer version of an FFNN; produces a hyperplane relative to the graph.</a:t>
             </a:r>
             <a:endParaRPr sz="1050">
               <a:solidFill>
@@ -10363,20 +10371,12 @@
               <a:buChar char="●"/>
             </a:pPr>
             <a:r>
-              <a:rPr b="1" lang="en">
-                <a:solidFill>
-                  <a:schemeClr val="dk1"/>
-                </a:solidFill>
-              </a:rPr>
-              <a:t>Perceptron</a:t>
-            </a:r>
-            <a:r>
-              <a:rPr lang="en">
-                <a:solidFill>
-                  <a:schemeClr val="dk1"/>
-                </a:solidFill>
-              </a:rPr>
-              <a:t> – A Classic Example!!!</a:t>
+              <a:rPr lang="en">
+                <a:solidFill>
+                  <a:schemeClr val="dk1"/>
+                </a:solidFill>
+              </a:rPr>
+              <a:t>A Classic Example!!!</a:t>
             </a:r>
             <a:endParaRPr>
               <a:solidFill>
@@ -11787,7 +11787,23 @@
                   <a:schemeClr val="dk1"/>
                 </a:solidFill>
               </a:rPr>
-              <a:t>, every node in a layer n is connected once to every node in the previous layer n - 1</a:t>
+              <a:t>, every node in a layer n is connected once to every node in the previous layer n - 1, with there being </a:t>
+            </a:r>
+            <a:r>
+              <a:rPr lang="en">
+                <a:solidFill>
+                  <a:schemeClr val="dk1"/>
+                </a:solidFill>
+              </a:rPr>
+              <a:t>only</a:t>
+            </a:r>
+            <a:r>
+              <a:rPr lang="en">
+                <a:solidFill>
+                  <a:schemeClr val="dk1"/>
+                </a:solidFill>
+              </a:rPr>
+              <a:t> 1 layer in total</a:t>
             </a:r>
             <a:endParaRPr>
               <a:solidFill>
@@ -11813,8 +11829,8 @@
         </p:blipFill>
         <p:spPr>
           <a:xfrm>
-            <a:off x="2872150" y="2307379"/>
-            <a:ext cx="3711400" cy="2757700"/>
+            <a:off x="2202100" y="2411125"/>
+            <a:ext cx="4739800" cy="2501550"/>
           </a:xfrm>
           <a:prstGeom prst="rect">
             <a:avLst/>
@@ -16557,7 +16573,7 @@
         </p:spPr>
         <p:txBody>
           <a:bodyPr anchorCtr="0" anchor="t" bIns="91425" lIns="91425" spcFirstLastPara="1" rIns="91425" wrap="square" tIns="91425">
-            <a:normAutofit fontScale="47500" lnSpcReduction="10000"/>
+            <a:normAutofit fontScale="47500" lnSpcReduction="20000"/>
           </a:bodyPr>
           <a:lstStyle/>
           <a:p>
@@ -16802,7 +16818,7 @@
                 </a:solidFill>
                 <a:hlinkClick r:id="rId13"/>
               </a:rPr>
-              <a:t>https://en.wikipedia.org/wiki/Feedforward_neural_network</a:t>
+              <a:t>https://towardsdatascience.com/what-the-hell-is-perceptron-626217814f53</a:t>
             </a:r>
             <a:endParaRPr/>
           </a:p>
@@ -16824,7 +16840,7 @@
                 </a:solidFill>
                 <a:hlinkClick r:id="rId14"/>
               </a:rPr>
-              <a:t>https://en.wikipedia.org/wiki/Feedforward_neural_network</a:t>
+              <a:t>https://towardsdatascience.com/activation-functions-neural-networks-1cbd9f8d91d6</a:t>
             </a:r>
             <a:endParaRPr/>
           </a:p>
@@ -16846,7 +16862,7 @@
                 </a:solidFill>
                 <a:hlinkClick r:id="rId15"/>
               </a:rPr>
-              <a:t>https://www.youtube.com/watch?v=aircAruvnKk&amp;t=915s</a:t>
+              <a:t>https://en.wikipedia.org/wiki/Feedforward_neural_network</a:t>
             </a:r>
             <a:endParaRPr/>
           </a:p>
@@ -16868,7 +16884,7 @@
                 </a:solidFill>
                 <a:hlinkClick r:id="rId16"/>
               </a:rPr>
-              <a:t>https://www.techtarget.com/searchenterpriseai/definition/recurrent-neural-networks</a:t>
+              <a:t>https://en.wikipedia.org/wiki/Feedforward_neural_network</a:t>
             </a:r>
             <a:endParaRPr/>
           </a:p>
@@ -16890,7 +16906,7 @@
                 </a:solidFill>
                 <a:hlinkClick r:id="rId17"/>
               </a:rPr>
-              <a:t>https://www.geeksforgeeks.org/introduction-to-recurrent-neural-network/</a:t>
+              <a:t>https://en.wikipedia.org/wiki/Feedforward_neural_network</a:t>
             </a:r>
             <a:endParaRPr/>
           </a:p>
@@ -16912,7 +16928,7 @@
                 </a:solidFill>
                 <a:hlinkClick r:id="rId18"/>
               </a:rPr>
-              <a:t>https://www.ibm.com/cloud/learn/recurrent-neural-networks</a:t>
+              <a:t>https://www.youtube.com/watch?v=aircAruvnKk&amp;t=915s</a:t>
             </a:r>
             <a:endParaRPr/>
           </a:p>
@@ -16934,7 +16950,7 @@
                 </a:solidFill>
                 <a:hlinkClick r:id="rId19"/>
               </a:rPr>
-              <a:t>https://towardsdatascience.com/illustrated-guide-to-lstms-and-gru-s-a-step-by-step-explanation-44e9eb85bf21</a:t>
+              <a:t>https://www.techtarget.com/searchenterpriseai/definition/recurrent-neural-networks</a:t>
             </a:r>
             <a:endParaRPr/>
           </a:p>
@@ -16956,7 +16972,7 @@
                 </a:solidFill>
                 <a:hlinkClick r:id="rId20"/>
               </a:rPr>
-              <a:t>https://towardsdatascience.com/what-is-an-encoder-decoder-model-86b3d57c5e1a</a:t>
+              <a:t>https://www.geeksforgeeks.org/introduction-to-recurrent-neural-network/</a:t>
             </a:r>
             <a:endParaRPr/>
           </a:p>
@@ -16978,7 +16994,7 @@
                 </a:solidFill>
                 <a:hlinkClick r:id="rId21"/>
               </a:rPr>
-              <a:t>https://arxiv.org/abs/1706.03762</a:t>
+              <a:t>https://www.ibm.com/cloud/learn/recurrent-neural-networks</a:t>
             </a:r>
             <a:endParaRPr/>
           </a:p>
@@ -17000,7 +17016,7 @@
                 </a:solidFill>
                 <a:hlinkClick r:id="rId22"/>
               </a:rPr>
-              <a:t>https://jalammar.github.io/illustrated-transformer/</a:t>
+              <a:t>https://towardsdatascience.com/illustrated-guide-to-lstms-and-gru-s-a-step-by-step-explanation-44e9eb85bf21</a:t>
             </a:r>
             <a:endParaRPr/>
           </a:p>
@@ -17022,7 +17038,7 @@
                 </a:solidFill>
                 <a:hlinkClick r:id="rId23"/>
               </a:rPr>
-              <a:t>https://www.topbots.com/leading-nlp-language-models-2020</a:t>
+              <a:t>https://towardsdatascience.com/what-is-an-encoder-decoder-model-86b3d57c5e1a</a:t>
             </a:r>
             <a:endParaRPr/>
           </a:p>
@@ -17044,7 +17060,7 @@
                 </a:solidFill>
                 <a:hlinkClick r:id="rId24"/>
               </a:rPr>
-              <a:t>https://www.youtube.com/watch?v=ftWlj4FBHTg</a:t>
+              <a:t>https://arxiv.org/abs/1706.03762</a:t>
             </a:r>
             <a:endParaRPr/>
           </a:p>
@@ -17066,6 +17082,72 @@
                 </a:solidFill>
                 <a:hlinkClick r:id="rId25"/>
               </a:rPr>
+              <a:t>https://jalammar.github.io/illustrated-transformer/</a:t>
+            </a:r>
+            <a:endParaRPr/>
+          </a:p>
+          <a:p>
+            <a:pPr indent="-282892" lvl="0" marL="457200" rtl="0" algn="l">
+              <a:spcBef>
+                <a:spcPts val="0"/>
+              </a:spcBef>
+              <a:spcAft>
+                <a:spcPts val="0"/>
+              </a:spcAft>
+              <a:buSzPct val="100000"/>
+              <a:buChar char="●"/>
+            </a:pPr>
+            <a:r>
+              <a:rPr lang="en" u="sng">
+                <a:solidFill>
+                  <a:schemeClr val="hlink"/>
+                </a:solidFill>
+                <a:hlinkClick r:id="rId26"/>
+              </a:rPr>
+              <a:t>https://www.topbots.com/leading-nlp-language-models-2020</a:t>
+            </a:r>
+            <a:endParaRPr/>
+          </a:p>
+          <a:p>
+            <a:pPr indent="-282892" lvl="0" marL="457200" rtl="0" algn="l">
+              <a:spcBef>
+                <a:spcPts val="0"/>
+              </a:spcBef>
+              <a:spcAft>
+                <a:spcPts val="0"/>
+              </a:spcAft>
+              <a:buSzPct val="100000"/>
+              <a:buChar char="●"/>
+            </a:pPr>
+            <a:r>
+              <a:rPr lang="en" u="sng">
+                <a:solidFill>
+                  <a:schemeClr val="hlink"/>
+                </a:solidFill>
+                <a:hlinkClick r:id="rId27"/>
+              </a:rPr>
+              <a:t>https://www.youtube.com/watch?v=ftWlj4FBHTg</a:t>
+            </a:r>
+            <a:endParaRPr/>
+          </a:p>
+          <a:p>
+            <a:pPr indent="-282892" lvl="0" marL="457200" rtl="0" algn="l">
+              <a:spcBef>
+                <a:spcPts val="0"/>
+              </a:spcBef>
+              <a:spcAft>
+                <a:spcPts val="0"/>
+              </a:spcAft>
+              <a:buSzPct val="100000"/>
+              <a:buChar char="●"/>
+            </a:pPr>
+            <a:r>
+              <a:rPr lang="en" u="sng">
+                <a:solidFill>
+                  <a:schemeClr val="hlink"/>
+                </a:solidFill>
+                <a:hlinkClick r:id="rId28"/>
+              </a:rPr>
               <a:t>https://towardsdatascience.com/transformers-the-bigger-the-better-19f39f222ee3#:~:text=The%20largest%20model%20so%20far&amp;text=This%20latest%20model%20from%20Google,%2FNVIDIA%20Megatron-Turing%20NLG</a:t>
             </a:r>
             <a:r>
@@ -17090,7 +17172,7 @@
                 <a:solidFill>
                   <a:schemeClr val="hlink"/>
                 </a:solidFill>
-                <a:hlinkClick r:id="rId26"/>
+                <a:hlinkClick r:id="rId29"/>
               </a:rPr>
               <a:t>https://scikit-learn.org/stable/</a:t>
             </a:r>
@@ -17112,7 +17194,7 @@
                 <a:solidFill>
                   <a:schemeClr val="hlink"/>
                 </a:solidFill>
-                <a:hlinkClick r:id="rId27"/>
+                <a:hlinkClick r:id="rId30"/>
               </a:rPr>
               <a:t>https://huggingface.co</a:t>
             </a:r>

</xml_diff>

<commit_message>
Made changes to slideshow and lecture demo
</commit_message>
<xml_diff>
--- a/Lecture on Machine Translation, Alejandro Ciuba.pptx
+++ b/Lecture on Machine Translation, Alejandro Ciuba.pptx
@@ -816,7 +816,7 @@
   <p:cSld>
     <p:spTree>
       <p:nvGrpSpPr>
-        <p:cNvPr id="115" name="Shape 115"/>
+        <p:cNvPr id="116" name="Shape 116"/>
         <p:cNvGrpSpPr/>
         <p:nvPr/>
       </p:nvGrpSpPr>
@@ -830,7 +830,7 @@
       </p:grpSpPr>
       <p:sp>
         <p:nvSpPr>
-          <p:cNvPr id="116" name="Google Shape;116;g19a34b97cdf_0_128:notes"/>
+          <p:cNvPr id="117" name="Google Shape;117;g19a34b97cdf_0_128:notes"/>
           <p:cNvSpPr/>
           <p:nvPr>
             <p:ph idx="2" type="sldImg"/>
@@ -865,7 +865,7 @@
       </p:sp>
       <p:sp>
         <p:nvSpPr>
-          <p:cNvPr id="117" name="Google Shape;117;g19a34b97cdf_0_128:notes"/>
+          <p:cNvPr id="118" name="Google Shape;118;g19a34b97cdf_0_128:notes"/>
           <p:cNvSpPr txBox="1"/>
           <p:nvPr>
             <p:ph idx="1" type="body"/>
@@ -952,7 +952,7 @@
   <p:cSld>
     <p:spTree>
       <p:nvGrpSpPr>
-        <p:cNvPr id="123" name="Shape 123"/>
+        <p:cNvPr id="124" name="Shape 124"/>
         <p:cNvGrpSpPr/>
         <p:nvPr/>
       </p:nvGrpSpPr>
@@ -966,7 +966,7 @@
       </p:grpSpPr>
       <p:sp>
         <p:nvSpPr>
-          <p:cNvPr id="124" name="Google Shape;124;g19a4b085407_0_1:notes"/>
+          <p:cNvPr id="125" name="Google Shape;125;g19a4b085407_0_1:notes"/>
           <p:cNvSpPr/>
           <p:nvPr>
             <p:ph idx="2" type="sldImg"/>
@@ -1001,7 +1001,7 @@
       </p:sp>
       <p:sp>
         <p:nvSpPr>
-          <p:cNvPr id="125" name="Google Shape;125;g19a4b085407_0_1:notes"/>
+          <p:cNvPr id="126" name="Google Shape;126;g19a4b085407_0_1:notes"/>
           <p:cNvSpPr txBox="1"/>
           <p:nvPr>
             <p:ph idx="1" type="body"/>
@@ -1080,7 +1080,7 @@
   <p:cSld>
     <p:spTree>
       <p:nvGrpSpPr>
-        <p:cNvPr id="130" name="Shape 130"/>
+        <p:cNvPr id="131" name="Shape 131"/>
         <p:cNvGrpSpPr/>
         <p:nvPr/>
       </p:nvGrpSpPr>
@@ -1094,7 +1094,7 @@
       </p:grpSpPr>
       <p:sp>
         <p:nvSpPr>
-          <p:cNvPr id="131" name="Google Shape;131;g19a4b085407_0_13:notes"/>
+          <p:cNvPr id="132" name="Google Shape;132;g19a4b085407_0_13:notes"/>
           <p:cNvSpPr/>
           <p:nvPr>
             <p:ph idx="2" type="sldImg"/>
@@ -1129,7 +1129,7 @@
       </p:sp>
       <p:sp>
         <p:nvSpPr>
-          <p:cNvPr id="132" name="Google Shape;132;g19a4b085407_0_13:notes"/>
+          <p:cNvPr id="133" name="Google Shape;133;g19a4b085407_0_13:notes"/>
           <p:cNvSpPr txBox="1"/>
           <p:nvPr>
             <p:ph idx="1" type="body"/>
@@ -1224,7 +1224,7 @@
   <p:cSld>
     <p:spTree>
       <p:nvGrpSpPr>
-        <p:cNvPr id="138" name="Shape 138"/>
+        <p:cNvPr id="139" name="Shape 139"/>
         <p:cNvGrpSpPr/>
         <p:nvPr/>
       </p:nvGrpSpPr>
@@ -1238,7 +1238,7 @@
       </p:grpSpPr>
       <p:sp>
         <p:nvSpPr>
-          <p:cNvPr id="139" name="Google Shape;139;g19a4b085407_0_7:notes"/>
+          <p:cNvPr id="140" name="Google Shape;140;g19a4b085407_0_7:notes"/>
           <p:cNvSpPr/>
           <p:nvPr>
             <p:ph idx="2" type="sldImg"/>
@@ -1273,7 +1273,7 @@
       </p:sp>
       <p:sp>
         <p:nvSpPr>
-          <p:cNvPr id="140" name="Google Shape;140;g19a4b085407_0_7:notes"/>
+          <p:cNvPr id="141" name="Google Shape;141;g19a4b085407_0_7:notes"/>
           <p:cNvSpPr txBox="1"/>
           <p:nvPr>
             <p:ph idx="1" type="body"/>
@@ -1352,7 +1352,7 @@
   <p:cSld>
     <p:spTree>
       <p:nvGrpSpPr>
-        <p:cNvPr id="145" name="Shape 145"/>
+        <p:cNvPr id="146" name="Shape 146"/>
         <p:cNvGrpSpPr/>
         <p:nvPr/>
       </p:nvGrpSpPr>
@@ -1366,7 +1366,7 @@
       </p:grpSpPr>
       <p:sp>
         <p:nvSpPr>
-          <p:cNvPr id="146" name="Google Shape;146;g19a57cc04a1_0_2:notes"/>
+          <p:cNvPr id="147" name="Google Shape;147;g19a57cc04a1_0_2:notes"/>
           <p:cNvSpPr/>
           <p:nvPr>
             <p:ph idx="2" type="sldImg"/>
@@ -1401,7 +1401,7 @@
       </p:sp>
       <p:sp>
         <p:nvSpPr>
-          <p:cNvPr id="147" name="Google Shape;147;g19a57cc04a1_0_2:notes"/>
+          <p:cNvPr id="148" name="Google Shape;148;g19a57cc04a1_0_2:notes"/>
           <p:cNvSpPr txBox="1"/>
           <p:nvPr>
             <p:ph idx="1" type="body"/>
@@ -1548,7 +1548,7 @@
   <p:cSld>
     <p:spTree>
       <p:nvGrpSpPr>
-        <p:cNvPr id="152" name="Shape 152"/>
+        <p:cNvPr id="153" name="Shape 153"/>
         <p:cNvGrpSpPr/>
         <p:nvPr/>
       </p:nvGrpSpPr>
@@ -1562,7 +1562,7 @@
       </p:grpSpPr>
       <p:sp>
         <p:nvSpPr>
-          <p:cNvPr id="153" name="Google Shape;153;g19a57cc04a1_0_8:notes"/>
+          <p:cNvPr id="154" name="Google Shape;154;g19a57cc04a1_0_8:notes"/>
           <p:cNvSpPr/>
           <p:nvPr>
             <p:ph idx="2" type="sldImg"/>
@@ -1597,7 +1597,7 @@
       </p:sp>
       <p:sp>
         <p:nvSpPr>
-          <p:cNvPr id="154" name="Google Shape;154;g19a57cc04a1_0_8:notes"/>
+          <p:cNvPr id="155" name="Google Shape;155;g19a57cc04a1_0_8:notes"/>
           <p:cNvSpPr txBox="1"/>
           <p:nvPr>
             <p:ph idx="1" type="body"/>
@@ -1714,7 +1714,7 @@
   <p:cSld>
     <p:spTree>
       <p:nvGrpSpPr>
-        <p:cNvPr id="160" name="Shape 160"/>
+        <p:cNvPr id="161" name="Shape 161"/>
         <p:cNvGrpSpPr/>
         <p:nvPr/>
       </p:nvGrpSpPr>
@@ -1728,7 +1728,7 @@
       </p:grpSpPr>
       <p:sp>
         <p:nvSpPr>
-          <p:cNvPr id="161" name="Google Shape;161;g19a57cc04a1_0_16:notes"/>
+          <p:cNvPr id="162" name="Google Shape;162;g19a57cc04a1_0_16:notes"/>
           <p:cNvSpPr/>
           <p:nvPr>
             <p:ph idx="2" type="sldImg"/>
@@ -1763,7 +1763,7 @@
       </p:sp>
       <p:sp>
         <p:nvSpPr>
-          <p:cNvPr id="162" name="Google Shape;162;g19a57cc04a1_0_16:notes"/>
+          <p:cNvPr id="163" name="Google Shape;163;g19a57cc04a1_0_16:notes"/>
           <p:cNvSpPr txBox="1"/>
           <p:nvPr>
             <p:ph idx="1" type="body"/>
@@ -1820,7 +1820,7 @@
   <p:cSld>
     <p:spTree>
       <p:nvGrpSpPr>
-        <p:cNvPr id="167" name="Shape 167"/>
+        <p:cNvPr id="168" name="Shape 168"/>
         <p:cNvGrpSpPr/>
         <p:nvPr/>
       </p:nvGrpSpPr>
@@ -1834,7 +1834,7 @@
       </p:grpSpPr>
       <p:sp>
         <p:nvSpPr>
-          <p:cNvPr id="168" name="Google Shape;168;g19a57cc04a1_0_23:notes"/>
+          <p:cNvPr id="169" name="Google Shape;169;g19a57cc04a1_0_23:notes"/>
           <p:cNvSpPr/>
           <p:nvPr>
             <p:ph idx="2" type="sldImg"/>
@@ -1869,7 +1869,7 @@
       </p:sp>
       <p:sp>
         <p:nvSpPr>
-          <p:cNvPr id="169" name="Google Shape;169;g19a57cc04a1_0_23:notes"/>
+          <p:cNvPr id="170" name="Google Shape;170;g19a57cc04a1_0_23:notes"/>
           <p:cNvSpPr txBox="1"/>
           <p:nvPr>
             <p:ph idx="1" type="body"/>
@@ -1934,7 +1934,7 @@
   <p:cSld>
     <p:spTree>
       <p:nvGrpSpPr>
-        <p:cNvPr id="176" name="Shape 176"/>
+        <p:cNvPr id="177" name="Shape 177"/>
         <p:cNvGrpSpPr/>
         <p:nvPr/>
       </p:nvGrpSpPr>
@@ -1948,7 +1948,7 @@
       </p:grpSpPr>
       <p:sp>
         <p:nvSpPr>
-          <p:cNvPr id="177" name="Google Shape;177;g19a57cc04a1_0_39:notes"/>
+          <p:cNvPr id="178" name="Google Shape;178;g19a57cc04a1_0_39:notes"/>
           <p:cNvSpPr/>
           <p:nvPr>
             <p:ph idx="2" type="sldImg"/>
@@ -1983,7 +1983,7 @@
       </p:sp>
       <p:sp>
         <p:nvSpPr>
-          <p:cNvPr id="178" name="Google Shape;178;g19a57cc04a1_0_39:notes"/>
+          <p:cNvPr id="179" name="Google Shape;179;g19a57cc04a1_0_39:notes"/>
           <p:cNvSpPr txBox="1"/>
           <p:nvPr>
             <p:ph idx="1" type="body"/>
@@ -2048,7 +2048,7 @@
   <p:cSld>
     <p:spTree>
       <p:nvGrpSpPr>
-        <p:cNvPr id="183" name="Shape 183"/>
+        <p:cNvPr id="184" name="Shape 184"/>
         <p:cNvGrpSpPr/>
         <p:nvPr/>
       </p:nvGrpSpPr>
@@ -2062,7 +2062,7 @@
       </p:grpSpPr>
       <p:sp>
         <p:nvSpPr>
-          <p:cNvPr id="184" name="Google Shape;184;g19a57cc04a1_0_63:notes"/>
+          <p:cNvPr id="185" name="Google Shape;185;g19a57cc04a1_0_63:notes"/>
           <p:cNvSpPr/>
           <p:nvPr>
             <p:ph idx="2" type="sldImg"/>
@@ -2097,7 +2097,7 @@
       </p:sp>
       <p:sp>
         <p:nvSpPr>
-          <p:cNvPr id="185" name="Google Shape;185;g19a57cc04a1_0_63:notes"/>
+          <p:cNvPr id="186" name="Google Shape;186;g19a57cc04a1_0_63:notes"/>
           <p:cNvSpPr txBox="1"/>
           <p:nvPr>
             <p:ph idx="1" type="body"/>
@@ -2173,7 +2173,7 @@
   <p:cSld>
     <p:spTree>
       <p:nvGrpSpPr>
-        <p:cNvPr id="56" name="Shape 56"/>
+        <p:cNvPr id="57" name="Shape 57"/>
         <p:cNvGrpSpPr/>
         <p:nvPr/>
       </p:nvGrpSpPr>
@@ -2187,7 +2187,7 @@
       </p:grpSpPr>
       <p:sp>
         <p:nvSpPr>
-          <p:cNvPr id="57" name="Google Shape;57;g19a34b97cdf_0_45:notes"/>
+          <p:cNvPr id="58" name="Google Shape;58;g19a34b97cdf_0_45:notes"/>
           <p:cNvSpPr/>
           <p:nvPr>
             <p:ph idx="2" type="sldImg"/>
@@ -2222,7 +2222,7 @@
       </p:sp>
       <p:sp>
         <p:nvSpPr>
-          <p:cNvPr id="58" name="Google Shape;58;g19a34b97cdf_0_45:notes"/>
+          <p:cNvPr id="59" name="Google Shape;59;g19a34b97cdf_0_45:notes"/>
           <p:cNvSpPr txBox="1"/>
           <p:nvPr>
             <p:ph idx="1" type="body"/>
@@ -2272,7 +2272,7 @@
   <p:cSld>
     <p:spTree>
       <p:nvGrpSpPr>
-        <p:cNvPr id="191" name="Shape 191"/>
+        <p:cNvPr id="192" name="Shape 192"/>
         <p:cNvGrpSpPr/>
         <p:nvPr/>
       </p:nvGrpSpPr>
@@ -2286,7 +2286,7 @@
       </p:grpSpPr>
       <p:sp>
         <p:nvSpPr>
-          <p:cNvPr id="192" name="Google Shape;192;g19a57cc04a1_0_48:notes"/>
+          <p:cNvPr id="193" name="Google Shape;193;g19a57cc04a1_0_48:notes"/>
           <p:cNvSpPr/>
           <p:nvPr>
             <p:ph idx="2" type="sldImg"/>
@@ -2321,7 +2321,7 @@
       </p:sp>
       <p:sp>
         <p:nvSpPr>
-          <p:cNvPr id="193" name="Google Shape;193;g19a57cc04a1_0_48:notes"/>
+          <p:cNvPr id="194" name="Google Shape;194;g19a57cc04a1_0_48:notes"/>
           <p:cNvSpPr txBox="1"/>
           <p:nvPr>
             <p:ph idx="1" type="body"/>
@@ -2378,7 +2378,7 @@
   <p:cSld>
     <p:spTree>
       <p:nvGrpSpPr>
-        <p:cNvPr id="198" name="Shape 198"/>
+        <p:cNvPr id="199" name="Shape 199"/>
         <p:cNvGrpSpPr/>
         <p:nvPr/>
       </p:nvGrpSpPr>
@@ -2392,7 +2392,7 @@
       </p:grpSpPr>
       <p:sp>
         <p:nvSpPr>
-          <p:cNvPr id="199" name="Google Shape;199;g19a57cc04a1_0_55:notes"/>
+          <p:cNvPr id="200" name="Google Shape;200;g19a57cc04a1_0_55:notes"/>
           <p:cNvSpPr/>
           <p:nvPr>
             <p:ph idx="2" type="sldImg"/>
@@ -2427,7 +2427,7 @@
       </p:sp>
       <p:sp>
         <p:nvSpPr>
-          <p:cNvPr id="200" name="Google Shape;200;g19a57cc04a1_0_55:notes"/>
+          <p:cNvPr id="201" name="Google Shape;201;g19a57cc04a1_0_55:notes"/>
           <p:cNvSpPr txBox="1"/>
           <p:nvPr>
             <p:ph idx="1" type="body"/>
@@ -2552,7 +2552,7 @@
   <p:cSld>
     <p:spTree>
       <p:nvGrpSpPr>
-        <p:cNvPr id="205" name="Shape 205"/>
+        <p:cNvPr id="206" name="Shape 206"/>
         <p:cNvGrpSpPr/>
         <p:nvPr/>
       </p:nvGrpSpPr>
@@ -2566,7 +2566,7 @@
       </p:grpSpPr>
       <p:sp>
         <p:nvSpPr>
-          <p:cNvPr id="206" name="Google Shape;206;g19a523d187a_0_6:notes"/>
+          <p:cNvPr id="207" name="Google Shape;207;g19a523d187a_0_6:notes"/>
           <p:cNvSpPr/>
           <p:nvPr>
             <p:ph idx="2" type="sldImg"/>
@@ -2601,7 +2601,7 @@
       </p:sp>
       <p:sp>
         <p:nvSpPr>
-          <p:cNvPr id="207" name="Google Shape;207;g19a523d187a_0_6:notes"/>
+          <p:cNvPr id="208" name="Google Shape;208;g19a523d187a_0_6:notes"/>
           <p:cNvSpPr txBox="1"/>
           <p:nvPr>
             <p:ph idx="1" type="body"/>
@@ -2696,7 +2696,7 @@
   <p:cSld>
     <p:spTree>
       <p:nvGrpSpPr>
-        <p:cNvPr id="212" name="Shape 212"/>
+        <p:cNvPr id="213" name="Shape 213"/>
         <p:cNvGrpSpPr/>
         <p:nvPr/>
       </p:nvGrpSpPr>
@@ -2710,7 +2710,7 @@
       </p:grpSpPr>
       <p:sp>
         <p:nvSpPr>
-          <p:cNvPr id="213" name="Google Shape;213;g19a523d187a_0_18:notes"/>
+          <p:cNvPr id="214" name="Google Shape;214;g19a523d187a_0_18:notes"/>
           <p:cNvSpPr/>
           <p:nvPr>
             <p:ph idx="2" type="sldImg"/>
@@ -2745,7 +2745,7 @@
       </p:sp>
       <p:sp>
         <p:nvSpPr>
-          <p:cNvPr id="214" name="Google Shape;214;g19a523d187a_0_18:notes"/>
+          <p:cNvPr id="215" name="Google Shape;215;g19a523d187a_0_18:notes"/>
           <p:cNvSpPr txBox="1"/>
           <p:nvPr>
             <p:ph idx="1" type="body"/>
@@ -2810,7 +2810,7 @@
   <p:cSld>
     <p:spTree>
       <p:nvGrpSpPr>
-        <p:cNvPr id="219" name="Shape 219"/>
+        <p:cNvPr id="220" name="Shape 220"/>
         <p:cNvGrpSpPr/>
         <p:nvPr/>
       </p:nvGrpSpPr>
@@ -2824,7 +2824,7 @@
       </p:grpSpPr>
       <p:sp>
         <p:nvSpPr>
-          <p:cNvPr id="220" name="Google Shape;220;g19a523d187a_0_28:notes"/>
+          <p:cNvPr id="221" name="Google Shape;221;g19a523d187a_0_28:notes"/>
           <p:cNvSpPr/>
           <p:nvPr>
             <p:ph idx="2" type="sldImg"/>
@@ -2859,7 +2859,7 @@
       </p:sp>
       <p:sp>
         <p:nvSpPr>
-          <p:cNvPr id="221" name="Google Shape;221;g19a523d187a_0_28:notes"/>
+          <p:cNvPr id="222" name="Google Shape;222;g19a523d187a_0_28:notes"/>
           <p:cNvSpPr txBox="1"/>
           <p:nvPr>
             <p:ph idx="1" type="body"/>
@@ -2924,7 +2924,7 @@
   <p:cSld>
     <p:spTree>
       <p:nvGrpSpPr>
-        <p:cNvPr id="226" name="Shape 226"/>
+        <p:cNvPr id="227" name="Shape 227"/>
         <p:cNvGrpSpPr/>
         <p:nvPr/>
       </p:nvGrpSpPr>
@@ -2938,7 +2938,7 @@
       </p:grpSpPr>
       <p:sp>
         <p:nvSpPr>
-          <p:cNvPr id="227" name="Google Shape;227;g19a523d187a_0_34:notes"/>
+          <p:cNvPr id="228" name="Google Shape;228;g19a523d187a_0_34:notes"/>
           <p:cNvSpPr/>
           <p:nvPr>
             <p:ph idx="2" type="sldImg"/>
@@ -2973,7 +2973,7 @@
       </p:sp>
       <p:sp>
         <p:nvSpPr>
-          <p:cNvPr id="228" name="Google Shape;228;g19a523d187a_0_34:notes"/>
+          <p:cNvPr id="229" name="Google Shape;229;g19a523d187a_0_34:notes"/>
           <p:cNvSpPr txBox="1"/>
           <p:nvPr>
             <p:ph idx="1" type="body"/>
@@ -3023,7 +3023,7 @@
   <p:cSld>
     <p:spTree>
       <p:nvGrpSpPr>
-        <p:cNvPr id="231" name="Shape 231"/>
+        <p:cNvPr id="232" name="Shape 232"/>
         <p:cNvGrpSpPr/>
         <p:nvPr/>
       </p:nvGrpSpPr>
@@ -3037,7 +3037,7 @@
       </p:grpSpPr>
       <p:sp>
         <p:nvSpPr>
-          <p:cNvPr id="232" name="Google Shape;232;g19a523d187a_0_38:notes"/>
+          <p:cNvPr id="233" name="Google Shape;233;g19a523d187a_0_38:notes"/>
           <p:cNvSpPr/>
           <p:nvPr>
             <p:ph idx="2" type="sldImg"/>
@@ -3072,7 +3072,7 @@
       </p:sp>
       <p:sp>
         <p:nvSpPr>
-          <p:cNvPr id="233" name="Google Shape;233;g19a523d187a_0_38:notes"/>
+          <p:cNvPr id="234" name="Google Shape;234;g19a523d187a_0_38:notes"/>
           <p:cNvSpPr txBox="1"/>
           <p:nvPr>
             <p:ph idx="1" type="body"/>
@@ -3137,7 +3137,7 @@
   <p:cSld>
     <p:spTree>
       <p:nvGrpSpPr>
-        <p:cNvPr id="238" name="Shape 238"/>
+        <p:cNvPr id="239" name="Shape 239"/>
         <p:cNvGrpSpPr/>
         <p:nvPr/>
       </p:nvGrpSpPr>
@@ -3151,7 +3151,7 @@
       </p:grpSpPr>
       <p:sp>
         <p:nvSpPr>
-          <p:cNvPr id="239" name="Google Shape;239;g19a34b97cdf_0_91:notes"/>
+          <p:cNvPr id="240" name="Google Shape;240;g19a34b97cdf_0_91:notes"/>
           <p:cNvSpPr/>
           <p:nvPr>
             <p:ph idx="2" type="sldImg"/>
@@ -3186,7 +3186,7 @@
       </p:sp>
       <p:sp>
         <p:nvSpPr>
-          <p:cNvPr id="240" name="Google Shape;240;g19a34b97cdf_0_91:notes"/>
+          <p:cNvPr id="241" name="Google Shape;241;g19a34b97cdf_0_91:notes"/>
           <p:cNvSpPr txBox="1"/>
           <p:nvPr>
             <p:ph idx="1" type="body"/>
@@ -3236,7 +3236,7 @@
   <p:cSld>
     <p:spTree>
       <p:nvGrpSpPr>
-        <p:cNvPr id="63" name="Shape 63"/>
+        <p:cNvPr id="64" name="Shape 64"/>
         <p:cNvGrpSpPr/>
         <p:nvPr/>
       </p:nvGrpSpPr>
@@ -3250,7 +3250,7 @@
       </p:grpSpPr>
       <p:sp>
         <p:nvSpPr>
-          <p:cNvPr id="64" name="Google Shape;64;g19a34b97cdf_0_57:notes"/>
+          <p:cNvPr id="65" name="Google Shape;65;g19a34b97cdf_0_57:notes"/>
           <p:cNvSpPr/>
           <p:nvPr>
             <p:ph idx="2" type="sldImg"/>
@@ -3285,7 +3285,7 @@
       </p:sp>
       <p:sp>
         <p:nvSpPr>
-          <p:cNvPr id="65" name="Google Shape;65;g19a34b97cdf_0_57:notes"/>
+          <p:cNvPr id="66" name="Google Shape;66;g19a34b97cdf_0_57:notes"/>
           <p:cNvSpPr txBox="1"/>
           <p:nvPr>
             <p:ph idx="1" type="body"/>
@@ -3335,7 +3335,7 @@
   <p:cSld>
     <p:spTree>
       <p:nvGrpSpPr>
-        <p:cNvPr id="68" name="Shape 68"/>
+        <p:cNvPr id="69" name="Shape 69"/>
         <p:cNvGrpSpPr/>
         <p:nvPr/>
       </p:nvGrpSpPr>
@@ -3349,7 +3349,7 @@
       </p:grpSpPr>
       <p:sp>
         <p:nvSpPr>
-          <p:cNvPr id="69" name="Google Shape;69;g19a34b97cdf_0_63:notes"/>
+          <p:cNvPr id="70" name="Google Shape;70;g19a34b97cdf_0_63:notes"/>
           <p:cNvSpPr/>
           <p:nvPr>
             <p:ph idx="2" type="sldImg"/>
@@ -3384,7 +3384,7 @@
       </p:sp>
       <p:sp>
         <p:nvSpPr>
-          <p:cNvPr id="70" name="Google Shape;70;g19a34b97cdf_0_63:notes"/>
+          <p:cNvPr id="71" name="Google Shape;71;g19a34b97cdf_0_63:notes"/>
           <p:cNvSpPr txBox="1"/>
           <p:nvPr>
             <p:ph idx="1" type="body"/>
@@ -3557,7 +3557,7 @@
   <p:cSld>
     <p:spTree>
       <p:nvGrpSpPr>
-        <p:cNvPr id="75" name="Shape 75"/>
+        <p:cNvPr id="76" name="Shape 76"/>
         <p:cNvGrpSpPr/>
         <p:nvPr/>
       </p:nvGrpSpPr>
@@ -3571,7 +3571,7 @@
       </p:grpSpPr>
       <p:sp>
         <p:nvSpPr>
-          <p:cNvPr id="76" name="Google Shape;76;g19a34b97cdf_0_72:notes"/>
+          <p:cNvPr id="77" name="Google Shape;77;g19a34b97cdf_0_72:notes"/>
           <p:cNvSpPr/>
           <p:nvPr>
             <p:ph idx="2" type="sldImg"/>
@@ -3606,7 +3606,7 @@
       </p:sp>
       <p:sp>
         <p:nvSpPr>
-          <p:cNvPr id="77" name="Google Shape;77;g19a34b97cdf_0_72:notes"/>
+          <p:cNvPr id="78" name="Google Shape;78;g19a34b97cdf_0_72:notes"/>
           <p:cNvSpPr txBox="1"/>
           <p:nvPr>
             <p:ph idx="1" type="body"/>
@@ -3734,7 +3734,7 @@
   <p:cSld>
     <p:spTree>
       <p:nvGrpSpPr>
-        <p:cNvPr id="82" name="Shape 82"/>
+        <p:cNvPr id="83" name="Shape 83"/>
         <p:cNvGrpSpPr/>
         <p:nvPr/>
       </p:nvGrpSpPr>
@@ -3748,7 +3748,7 @@
       </p:grpSpPr>
       <p:sp>
         <p:nvSpPr>
-          <p:cNvPr id="83" name="Google Shape;83;g19a34b97cdf_0_79:notes"/>
+          <p:cNvPr id="84" name="Google Shape;84;g19a34b97cdf_0_79:notes"/>
           <p:cNvSpPr/>
           <p:nvPr>
             <p:ph idx="2" type="sldImg"/>
@@ -3783,7 +3783,7 @@
       </p:sp>
       <p:sp>
         <p:nvSpPr>
-          <p:cNvPr id="84" name="Google Shape;84;g19a34b97cdf_0_79:notes"/>
+          <p:cNvPr id="85" name="Google Shape;85;g19a34b97cdf_0_79:notes"/>
           <p:cNvSpPr txBox="1"/>
           <p:nvPr>
             <p:ph idx="1" type="body"/>
@@ -3919,7 +3919,7 @@
   <p:cSld>
     <p:spTree>
       <p:nvGrpSpPr>
-        <p:cNvPr id="89" name="Shape 89"/>
+        <p:cNvPr id="90" name="Shape 90"/>
         <p:cNvGrpSpPr/>
         <p:nvPr/>
       </p:nvGrpSpPr>
@@ -3933,7 +3933,7 @@
       </p:grpSpPr>
       <p:sp>
         <p:nvSpPr>
-          <p:cNvPr id="90" name="Google Shape;90;g19a34b97cdf_0_85:notes"/>
+          <p:cNvPr id="91" name="Google Shape;91;g19a34b97cdf_0_85:notes"/>
           <p:cNvSpPr/>
           <p:nvPr>
             <p:ph idx="2" type="sldImg"/>
@@ -3968,7 +3968,7 @@
       </p:sp>
       <p:sp>
         <p:nvSpPr>
-          <p:cNvPr id="91" name="Google Shape;91;g19a34b97cdf_0_85:notes"/>
+          <p:cNvPr id="92" name="Google Shape;92;g19a34b97cdf_0_85:notes"/>
           <p:cNvSpPr txBox="1"/>
           <p:nvPr>
             <p:ph idx="1" type="body"/>
@@ -4047,7 +4047,7 @@
   <p:cSld>
     <p:spTree>
       <p:nvGrpSpPr>
-        <p:cNvPr id="96" name="Shape 96"/>
+        <p:cNvPr id="97" name="Shape 97"/>
         <p:cNvGrpSpPr/>
         <p:nvPr/>
       </p:nvGrpSpPr>
@@ -4061,7 +4061,7 @@
       </p:grpSpPr>
       <p:sp>
         <p:nvSpPr>
-          <p:cNvPr id="97" name="Google Shape;97;g19a34b97cdf_0_104:notes"/>
+          <p:cNvPr id="98" name="Google Shape;98;g19a34b97cdf_0_104:notes"/>
           <p:cNvSpPr/>
           <p:nvPr>
             <p:ph idx="2" type="sldImg"/>
@@ -4096,7 +4096,7 @@
       </p:sp>
       <p:sp>
         <p:nvSpPr>
-          <p:cNvPr id="98" name="Google Shape;98;g19a34b97cdf_0_104:notes"/>
+          <p:cNvPr id="99" name="Google Shape;99;g19a34b97cdf_0_104:notes"/>
           <p:cNvSpPr txBox="1"/>
           <p:nvPr>
             <p:ph idx="1" type="body"/>
@@ -4146,7 +4146,7 @@
   <p:cSld>
     <p:spTree>
       <p:nvGrpSpPr>
-        <p:cNvPr id="101" name="Shape 101"/>
+        <p:cNvPr id="102" name="Shape 102"/>
         <p:cNvGrpSpPr/>
         <p:nvPr/>
       </p:nvGrpSpPr>
@@ -4160,7 +4160,7 @@
       </p:grpSpPr>
       <p:sp>
         <p:nvSpPr>
-          <p:cNvPr id="102" name="Google Shape;102;g19a34b97cdf_0_110:notes"/>
+          <p:cNvPr id="103" name="Google Shape;103;g19a34b97cdf_0_110:notes"/>
           <p:cNvSpPr/>
           <p:nvPr>
             <p:ph idx="2" type="sldImg"/>
@@ -4195,7 +4195,7 @@
       </p:sp>
       <p:sp>
         <p:nvSpPr>
-          <p:cNvPr id="103" name="Google Shape;103;g19a34b97cdf_0_110:notes"/>
+          <p:cNvPr id="104" name="Google Shape;104;g19a34b97cdf_0_110:notes"/>
           <p:cNvSpPr txBox="1"/>
           <p:nvPr>
             <p:ph idx="1" type="body"/>
@@ -9140,7 +9140,7 @@
         </p:spPr>
         <p:txBody>
           <a:bodyPr anchorCtr="0" anchor="t" bIns="91425" lIns="91425" spcFirstLastPara="1" rIns="91425" wrap="square" tIns="91425">
-            <a:normAutofit fontScale="77500" lnSpcReduction="20000"/>
+            <a:normAutofit fontScale="92500" lnSpcReduction="10000"/>
           </a:bodyPr>
           <a:lstStyle/>
           <a:p>
@@ -9183,7 +9183,7 @@
                   <a:schemeClr val="dk1"/>
                 </a:solidFill>
               </a:rPr>
-              <a:t>Based on a presentation by Steve Sloto</a:t>
+              <a:t>LING1330 – Introduction to Computational Linguistics</a:t>
             </a:r>
             <a:endParaRPr>
               <a:solidFill>
@@ -9207,7 +9207,7 @@
                   <a:schemeClr val="dk1"/>
                 </a:solidFill>
               </a:rPr>
-              <a:t>LING1330 – Introduction to Computational Linguistics</a:t>
+              <a:t>December 1st, 2022</a:t>
             </a:r>
             <a:endParaRPr>
               <a:solidFill>
@@ -9215,29 +9215,59 @@
               </a:solidFill>
             </a:endParaRPr>
           </a:p>
-          <a:p>
-            <a:pPr indent="0" lvl="0" marL="0" rtl="0" algn="ctr">
-              <a:spcBef>
-                <a:spcPts val="0"/>
-              </a:spcBef>
-              <a:spcAft>
-                <a:spcPts val="0"/>
-              </a:spcAft>
-              <a:buNone/>
-            </a:pPr>
-            <a:r>
-              <a:rPr lang="en">
-                <a:solidFill>
-                  <a:schemeClr val="dk1"/>
-                </a:solidFill>
-              </a:rPr>
-              <a:t>December 1st, 2022</a:t>
-            </a:r>
-            <a:endParaRPr>
-              <a:solidFill>
-                <a:schemeClr val="dk1"/>
-              </a:solidFill>
-            </a:endParaRPr>
+        </p:txBody>
+      </p:sp>
+      <p:sp>
+        <p:nvSpPr>
+          <p:cNvPr id="56" name="Google Shape;56;p13"/>
+          <p:cNvSpPr txBox="1"/>
+          <p:nvPr/>
+        </p:nvSpPr>
+        <p:spPr>
+          <a:xfrm>
+            <a:off x="4771200" y="4804800"/>
+            <a:ext cx="4372800" cy="338700"/>
+          </a:xfrm>
+          <a:prstGeom prst="rect">
+            <a:avLst/>
+          </a:prstGeom>
+          <a:noFill/>
+          <a:ln>
+            <a:noFill/>
+          </a:ln>
+        </p:spPr>
+        <p:txBody>
+          <a:bodyPr anchorCtr="0" anchor="t" bIns="91425" lIns="91425" spcFirstLastPara="1" rIns="91425" wrap="square" tIns="91425">
+            <a:spAutoFit/>
+          </a:bodyPr>
+          <a:lstStyle/>
+          <a:p>
+            <a:pPr indent="0" lvl="0" marL="0" rtl="0" algn="r">
+              <a:spcBef>
+                <a:spcPts val="0"/>
+              </a:spcBef>
+              <a:spcAft>
+                <a:spcPts val="0"/>
+              </a:spcAft>
+              <a:buNone/>
+            </a:pPr>
+            <a:r>
+              <a:rPr lang="en" sz="1000">
+                <a:solidFill>
+                  <a:schemeClr val="dk1"/>
+                </a:solidFill>
+              </a:rPr>
+              <a:t>History slides b</a:t>
+            </a:r>
+            <a:r>
+              <a:rPr lang="en" sz="1000">
+                <a:solidFill>
+                  <a:schemeClr val="dk1"/>
+                </a:solidFill>
+              </a:rPr>
+              <a:t>ased from a presentation by Steve Sloto</a:t>
+            </a:r>
+            <a:endParaRPr sz="1000"/>
           </a:p>
         </p:txBody>
       </p:sp>
@@ -9254,7 +9284,7 @@
   <p:cSld>
     <p:spTree>
       <p:nvGrpSpPr>
-        <p:cNvPr id="118" name="Shape 118"/>
+        <p:cNvPr id="119" name="Shape 119"/>
         <p:cNvGrpSpPr/>
         <p:nvPr/>
       </p:nvGrpSpPr>
@@ -9268,7 +9298,7 @@
       </p:grpSpPr>
       <p:sp>
         <p:nvSpPr>
-          <p:cNvPr id="119" name="Google Shape;119;p22"/>
+          <p:cNvPr id="120" name="Google Shape;120;p22"/>
           <p:cNvSpPr txBox="1"/>
           <p:nvPr>
             <p:ph type="title"/>
@@ -9323,7 +9353,7 @@
       </p:sp>
       <p:sp>
         <p:nvSpPr>
-          <p:cNvPr id="120" name="Google Shape;120;p22"/>
+          <p:cNvPr id="121" name="Google Shape;121;p22"/>
           <p:cNvSpPr txBox="1"/>
           <p:nvPr>
             <p:ph idx="12" type="sldNum"/>
@@ -9371,7 +9401,7 @@
       </p:sp>
       <p:sp>
         <p:nvSpPr>
-          <p:cNvPr id="121" name="Google Shape;121;p22"/>
+          <p:cNvPr id="122" name="Google Shape;122;p22"/>
           <p:cNvSpPr txBox="1"/>
           <p:nvPr>
             <p:ph idx="1" type="body"/>
@@ -9656,7 +9686,7 @@
       </p:sp>
       <p:pic>
         <p:nvPicPr>
-          <p:cNvPr id="122" name="Google Shape;122;p22"/>
+          <p:cNvPr id="123" name="Google Shape;123;p22"/>
           <p:cNvPicPr preferRelativeResize="0"/>
           <p:nvPr/>
         </p:nvPicPr>
@@ -9695,7 +9725,7 @@
   <p:cSld>
     <p:spTree>
       <p:nvGrpSpPr>
-        <p:cNvPr id="126" name="Shape 126"/>
+        <p:cNvPr id="127" name="Shape 127"/>
         <p:cNvGrpSpPr/>
         <p:nvPr/>
       </p:nvGrpSpPr>
@@ -9709,7 +9739,7 @@
       </p:grpSpPr>
       <p:sp>
         <p:nvSpPr>
-          <p:cNvPr id="127" name="Google Shape;127;p23"/>
+          <p:cNvPr id="128" name="Google Shape;128;p23"/>
           <p:cNvSpPr txBox="1"/>
           <p:nvPr>
             <p:ph type="title"/>
@@ -9749,7 +9779,7 @@
       </p:sp>
       <p:sp>
         <p:nvSpPr>
-          <p:cNvPr id="128" name="Google Shape;128;p23"/>
+          <p:cNvPr id="129" name="Google Shape;129;p23"/>
           <p:cNvSpPr txBox="1"/>
           <p:nvPr>
             <p:ph idx="12" type="sldNum"/>
@@ -9797,7 +9827,7 @@
       </p:sp>
       <p:sp>
         <p:nvSpPr>
-          <p:cNvPr id="129" name="Google Shape;129;p23"/>
+          <p:cNvPr id="130" name="Google Shape;130;p23"/>
           <p:cNvSpPr txBox="1"/>
           <p:nvPr>
             <p:ph idx="1" type="body"/>
@@ -10063,7 +10093,7 @@
   <p:cSld>
     <p:spTree>
       <p:nvGrpSpPr>
-        <p:cNvPr id="133" name="Shape 133"/>
+        <p:cNvPr id="134" name="Shape 134"/>
         <p:cNvGrpSpPr/>
         <p:nvPr/>
       </p:nvGrpSpPr>
@@ -10077,7 +10107,7 @@
       </p:grpSpPr>
       <p:sp>
         <p:nvSpPr>
-          <p:cNvPr id="134" name="Google Shape;134;p24"/>
+          <p:cNvPr id="135" name="Google Shape;135;p24"/>
           <p:cNvSpPr txBox="1"/>
           <p:nvPr>
             <p:ph type="title"/>
@@ -10117,7 +10147,7 @@
       </p:sp>
       <p:sp>
         <p:nvSpPr>
-          <p:cNvPr id="135" name="Google Shape;135;p24"/>
+          <p:cNvPr id="136" name="Google Shape;136;p24"/>
           <p:cNvSpPr txBox="1"/>
           <p:nvPr>
             <p:ph idx="12" type="sldNum"/>
@@ -10165,7 +10195,7 @@
       </p:sp>
       <p:sp>
         <p:nvSpPr>
-          <p:cNvPr id="136" name="Google Shape;136;p24"/>
+          <p:cNvPr id="137" name="Google Shape;137;p24"/>
           <p:cNvSpPr txBox="1"/>
           <p:nvPr>
             <p:ph idx="1" type="body"/>
@@ -10628,7 +10658,7 @@
       </p:sp>
       <p:pic>
         <p:nvPicPr>
-          <p:cNvPr id="137" name="Google Shape;137;p24"/>
+          <p:cNvPr id="138" name="Google Shape;138;p24"/>
           <p:cNvPicPr preferRelativeResize="0"/>
           <p:nvPr/>
         </p:nvPicPr>
@@ -10667,7 +10697,7 @@
   <p:cSld>
     <p:spTree>
       <p:nvGrpSpPr>
-        <p:cNvPr id="141" name="Shape 141"/>
+        <p:cNvPr id="142" name="Shape 142"/>
         <p:cNvGrpSpPr/>
         <p:nvPr/>
       </p:nvGrpSpPr>
@@ -10681,7 +10711,7 @@
       </p:grpSpPr>
       <p:sp>
         <p:nvSpPr>
-          <p:cNvPr id="142" name="Google Shape;142;p25"/>
+          <p:cNvPr id="143" name="Google Shape;143;p25"/>
           <p:cNvSpPr txBox="1"/>
           <p:nvPr>
             <p:ph type="title"/>
@@ -10721,7 +10751,7 @@
       </p:sp>
       <p:sp>
         <p:nvSpPr>
-          <p:cNvPr id="143" name="Google Shape;143;p25"/>
+          <p:cNvPr id="144" name="Google Shape;144;p25"/>
           <p:cNvSpPr txBox="1"/>
           <p:nvPr>
             <p:ph idx="12" type="sldNum"/>
@@ -10769,7 +10799,7 @@
       </p:sp>
       <p:sp>
         <p:nvSpPr>
-          <p:cNvPr id="144" name="Google Shape;144;p25"/>
+          <p:cNvPr id="145" name="Google Shape;145;p25"/>
           <p:cNvSpPr txBox="1"/>
           <p:nvPr>
             <p:ph idx="1" type="body"/>
@@ -11043,7 +11073,7 @@
   <p:cSld>
     <p:spTree>
       <p:nvGrpSpPr>
-        <p:cNvPr id="148" name="Shape 148"/>
+        <p:cNvPr id="149" name="Shape 149"/>
         <p:cNvGrpSpPr/>
         <p:nvPr/>
       </p:nvGrpSpPr>
@@ -11057,7 +11087,7 @@
       </p:grpSpPr>
       <p:sp>
         <p:nvSpPr>
-          <p:cNvPr id="149" name="Google Shape;149;p26"/>
+          <p:cNvPr id="150" name="Google Shape;150;p26"/>
           <p:cNvSpPr txBox="1"/>
           <p:nvPr>
             <p:ph type="title"/>
@@ -11097,7 +11127,7 @@
       </p:sp>
       <p:sp>
         <p:nvSpPr>
-          <p:cNvPr id="150" name="Google Shape;150;p26"/>
+          <p:cNvPr id="151" name="Google Shape;151;p26"/>
           <p:cNvSpPr txBox="1"/>
           <p:nvPr>
             <p:ph idx="12" type="sldNum"/>
@@ -11145,7 +11175,7 @@
       </p:sp>
       <p:sp>
         <p:nvSpPr>
-          <p:cNvPr id="151" name="Google Shape;151;p26"/>
+          <p:cNvPr id="152" name="Google Shape;152;p26"/>
           <p:cNvSpPr txBox="1"/>
           <p:nvPr>
             <p:ph idx="1" type="body"/>
@@ -11509,7 +11539,7 @@
   <p:cSld>
     <p:spTree>
       <p:nvGrpSpPr>
-        <p:cNvPr id="155" name="Shape 155"/>
+        <p:cNvPr id="156" name="Shape 156"/>
         <p:cNvGrpSpPr/>
         <p:nvPr/>
       </p:nvGrpSpPr>
@@ -11523,7 +11553,7 @@
       </p:grpSpPr>
       <p:sp>
         <p:nvSpPr>
-          <p:cNvPr id="156" name="Google Shape;156;p27"/>
+          <p:cNvPr id="157" name="Google Shape;157;p27"/>
           <p:cNvSpPr txBox="1"/>
           <p:nvPr>
             <p:ph type="title"/>
@@ -11563,7 +11593,7 @@
       </p:sp>
       <p:sp>
         <p:nvSpPr>
-          <p:cNvPr id="157" name="Google Shape;157;p27"/>
+          <p:cNvPr id="158" name="Google Shape;158;p27"/>
           <p:cNvSpPr txBox="1"/>
           <p:nvPr>
             <p:ph idx="12" type="sldNum"/>
@@ -11611,7 +11641,7 @@
       </p:sp>
       <p:sp>
         <p:nvSpPr>
-          <p:cNvPr id="158" name="Google Shape;158;p27"/>
+          <p:cNvPr id="159" name="Google Shape;159;p27"/>
           <p:cNvSpPr txBox="1"/>
           <p:nvPr>
             <p:ph idx="1" type="body"/>
@@ -11815,7 +11845,7 @@
       </p:sp>
       <p:pic>
         <p:nvPicPr>
-          <p:cNvPr id="159" name="Google Shape;159;p27"/>
+          <p:cNvPr id="160" name="Google Shape;160;p27"/>
           <p:cNvPicPr preferRelativeResize="0"/>
           <p:nvPr/>
         </p:nvPicPr>
@@ -11854,7 +11884,7 @@
   <p:cSld>
     <p:spTree>
       <p:nvGrpSpPr>
-        <p:cNvPr id="163" name="Shape 163"/>
+        <p:cNvPr id="164" name="Shape 164"/>
         <p:cNvGrpSpPr/>
         <p:nvPr/>
       </p:nvGrpSpPr>
@@ -11868,7 +11898,7 @@
       </p:grpSpPr>
       <p:sp>
         <p:nvSpPr>
-          <p:cNvPr id="164" name="Google Shape;164;p28"/>
+          <p:cNvPr id="165" name="Google Shape;165;p28"/>
           <p:cNvSpPr txBox="1"/>
           <p:nvPr>
             <p:ph type="title"/>
@@ -11908,7 +11938,7 @@
       </p:sp>
       <p:sp>
         <p:nvSpPr>
-          <p:cNvPr id="165" name="Google Shape;165;p28"/>
+          <p:cNvPr id="166" name="Google Shape;166;p28"/>
           <p:cNvSpPr txBox="1"/>
           <p:nvPr>
             <p:ph idx="12" type="sldNum"/>
@@ -11956,7 +11986,7 @@
       </p:sp>
       <p:sp>
         <p:nvSpPr>
-          <p:cNvPr id="166" name="Google Shape;166;p28"/>
+          <p:cNvPr id="167" name="Google Shape;167;p28"/>
           <p:cNvSpPr txBox="1"/>
           <p:nvPr>
             <p:ph idx="1" type="body"/>
@@ -12263,62 +12293,6 @@
               </a:solidFill>
             </a:endParaRPr>
           </a:p>
-          <a:p>
-            <a:pPr indent="-317500" lvl="1" marL="914400" rtl="0" algn="l">
-              <a:spcBef>
-                <a:spcPts val="0"/>
-              </a:spcBef>
-              <a:spcAft>
-                <a:spcPts val="0"/>
-              </a:spcAft>
-              <a:buClr>
-                <a:schemeClr val="dk1"/>
-              </a:buClr>
-              <a:buSzPts val="1400"/>
-              <a:buChar char="○"/>
-            </a:pPr>
-            <a:r>
-              <a:rPr lang="en">
-                <a:solidFill>
-                  <a:schemeClr val="dk1"/>
-                </a:solidFill>
-              </a:rPr>
-              <a:t>Really bad at deterministic tasks</a:t>
-            </a:r>
-            <a:endParaRPr>
-              <a:solidFill>
-                <a:schemeClr val="dk1"/>
-              </a:solidFill>
-            </a:endParaRPr>
-          </a:p>
-          <a:p>
-            <a:pPr indent="-317500" lvl="2" marL="1371600" rtl="0" algn="l">
-              <a:spcBef>
-                <a:spcPts val="0"/>
-              </a:spcBef>
-              <a:spcAft>
-                <a:spcPts val="0"/>
-              </a:spcAft>
-              <a:buClr>
-                <a:schemeClr val="dk1"/>
-              </a:buClr>
-              <a:buSzPts val="1400"/>
-              <a:buChar char="■"/>
-            </a:pPr>
-            <a:r>
-              <a:rPr lang="en">
-                <a:solidFill>
-                  <a:schemeClr val="dk1"/>
-                </a:solidFill>
-              </a:rPr>
-              <a:t>E.g. logic gates</a:t>
-            </a:r>
-            <a:endParaRPr>
-              <a:solidFill>
-                <a:schemeClr val="dk1"/>
-              </a:solidFill>
-            </a:endParaRPr>
-          </a:p>
         </p:txBody>
       </p:sp>
     </p:spTree>
@@ -12334,7 +12308,7 @@
   <p:cSld>
     <p:spTree>
       <p:nvGrpSpPr>
-        <p:cNvPr id="170" name="Shape 170"/>
+        <p:cNvPr id="171" name="Shape 171"/>
         <p:cNvGrpSpPr/>
         <p:nvPr/>
       </p:nvGrpSpPr>
@@ -12348,7 +12322,7 @@
       </p:grpSpPr>
       <p:sp>
         <p:nvSpPr>
-          <p:cNvPr id="171" name="Google Shape;171;p29"/>
+          <p:cNvPr id="172" name="Google Shape;172;p29"/>
           <p:cNvSpPr txBox="1"/>
           <p:nvPr>
             <p:ph type="title"/>
@@ -12388,7 +12362,7 @@
       </p:sp>
       <p:sp>
         <p:nvSpPr>
-          <p:cNvPr id="172" name="Google Shape;172;p29"/>
+          <p:cNvPr id="173" name="Google Shape;173;p29"/>
           <p:cNvSpPr txBox="1"/>
           <p:nvPr>
             <p:ph idx="12" type="sldNum"/>
@@ -12436,7 +12410,7 @@
       </p:sp>
       <p:sp>
         <p:nvSpPr>
-          <p:cNvPr id="173" name="Google Shape;173;p29"/>
+          <p:cNvPr id="174" name="Google Shape;174;p29"/>
           <p:cNvSpPr txBox="1"/>
           <p:nvPr>
             <p:ph idx="1" type="body"/>
@@ -12636,7 +12610,7 @@
       </p:sp>
       <p:pic>
         <p:nvPicPr>
-          <p:cNvPr id="174" name="Google Shape;174;p29"/>
+          <p:cNvPr id="175" name="Google Shape;175;p29"/>
           <p:cNvPicPr preferRelativeResize="0"/>
           <p:nvPr/>
         </p:nvPicPr>
@@ -12664,7 +12638,7 @@
       </p:pic>
       <p:pic>
         <p:nvPicPr>
-          <p:cNvPr id="175" name="Google Shape;175;p29"/>
+          <p:cNvPr id="176" name="Google Shape;176;p29"/>
           <p:cNvPicPr preferRelativeResize="0"/>
           <p:nvPr/>
         </p:nvPicPr>
@@ -12703,7 +12677,7 @@
   <p:cSld>
     <p:spTree>
       <p:nvGrpSpPr>
-        <p:cNvPr id="179" name="Shape 179"/>
+        <p:cNvPr id="180" name="Shape 180"/>
         <p:cNvGrpSpPr/>
         <p:nvPr/>
       </p:nvGrpSpPr>
@@ -12717,7 +12691,7 @@
       </p:grpSpPr>
       <p:sp>
         <p:nvSpPr>
-          <p:cNvPr id="180" name="Google Shape;180;p30"/>
+          <p:cNvPr id="181" name="Google Shape;181;p30"/>
           <p:cNvSpPr txBox="1"/>
           <p:nvPr>
             <p:ph type="title"/>
@@ -12757,7 +12731,7 @@
       </p:sp>
       <p:sp>
         <p:nvSpPr>
-          <p:cNvPr id="181" name="Google Shape;181;p30"/>
+          <p:cNvPr id="182" name="Google Shape;182;p30"/>
           <p:cNvSpPr txBox="1"/>
           <p:nvPr>
             <p:ph idx="12" type="sldNum"/>
@@ -12805,7 +12779,7 @@
       </p:sp>
       <p:sp>
         <p:nvSpPr>
-          <p:cNvPr id="182" name="Google Shape;182;p30"/>
+          <p:cNvPr id="183" name="Google Shape;183;p30"/>
           <p:cNvSpPr txBox="1"/>
           <p:nvPr>
             <p:ph idx="1" type="body"/>
@@ -13195,7 +13169,7 @@
   <p:cSld>
     <p:spTree>
       <p:nvGrpSpPr>
-        <p:cNvPr id="186" name="Shape 186"/>
+        <p:cNvPr id="187" name="Shape 187"/>
         <p:cNvGrpSpPr/>
         <p:nvPr/>
       </p:nvGrpSpPr>
@@ -13209,7 +13183,7 @@
       </p:grpSpPr>
       <p:sp>
         <p:nvSpPr>
-          <p:cNvPr id="187" name="Google Shape;187;p31"/>
+          <p:cNvPr id="188" name="Google Shape;188;p31"/>
           <p:cNvSpPr txBox="1"/>
           <p:nvPr>
             <p:ph type="title"/>
@@ -13249,7 +13223,7 @@
       </p:sp>
       <p:sp>
         <p:nvSpPr>
-          <p:cNvPr id="188" name="Google Shape;188;p31"/>
+          <p:cNvPr id="189" name="Google Shape;189;p31"/>
           <p:cNvSpPr txBox="1"/>
           <p:nvPr>
             <p:ph idx="12" type="sldNum"/>
@@ -13297,7 +13271,7 @@
       </p:sp>
       <p:sp>
         <p:nvSpPr>
-          <p:cNvPr id="189" name="Google Shape;189;p31"/>
+          <p:cNvPr id="190" name="Google Shape;190;p31"/>
           <p:cNvSpPr txBox="1"/>
           <p:nvPr>
             <p:ph idx="1" type="body"/>
@@ -13441,7 +13415,7 @@
       </p:sp>
       <p:pic>
         <p:nvPicPr>
-          <p:cNvPr id="190" name="Google Shape;190;p31"/>
+          <p:cNvPr id="191" name="Google Shape;191;p31"/>
           <p:cNvPicPr preferRelativeResize="0"/>
           <p:nvPr/>
         </p:nvPicPr>
@@ -13480,7 +13454,7 @@
   <p:cSld>
     <p:spTree>
       <p:nvGrpSpPr>
-        <p:cNvPr id="59" name="Shape 59"/>
+        <p:cNvPr id="60" name="Shape 60"/>
         <p:cNvGrpSpPr/>
         <p:nvPr/>
       </p:nvGrpSpPr>
@@ -13494,7 +13468,7 @@
       </p:grpSpPr>
       <p:sp>
         <p:nvSpPr>
-          <p:cNvPr id="60" name="Google Shape;60;p14"/>
+          <p:cNvPr id="61" name="Google Shape;61;p14"/>
           <p:cNvSpPr txBox="1"/>
           <p:nvPr>
             <p:ph type="title"/>
@@ -13534,7 +13508,7 @@
       </p:sp>
       <p:sp>
         <p:nvSpPr>
-          <p:cNvPr id="61" name="Google Shape;61;p14"/>
+          <p:cNvPr id="62" name="Google Shape;62;p14"/>
           <p:cNvSpPr txBox="1"/>
           <p:nvPr>
             <p:ph idx="1" type="body"/>
@@ -13964,7 +13938,7 @@
       </p:sp>
       <p:sp>
         <p:nvSpPr>
-          <p:cNvPr id="62" name="Google Shape;62;p14"/>
+          <p:cNvPr id="63" name="Google Shape;63;p14"/>
           <p:cNvSpPr txBox="1"/>
           <p:nvPr>
             <p:ph idx="12" type="sldNum"/>
@@ -14023,7 +13997,7 @@
   <p:cSld>
     <p:spTree>
       <p:nvGrpSpPr>
-        <p:cNvPr id="194" name="Shape 194"/>
+        <p:cNvPr id="195" name="Shape 195"/>
         <p:cNvGrpSpPr/>
         <p:nvPr/>
       </p:nvGrpSpPr>
@@ -14037,7 +14011,7 @@
       </p:grpSpPr>
       <p:sp>
         <p:nvSpPr>
-          <p:cNvPr id="195" name="Google Shape;195;p32"/>
+          <p:cNvPr id="196" name="Google Shape;196;p32"/>
           <p:cNvSpPr txBox="1"/>
           <p:nvPr>
             <p:ph type="title"/>
@@ -14077,7 +14051,7 @@
       </p:sp>
       <p:sp>
         <p:nvSpPr>
-          <p:cNvPr id="196" name="Google Shape;196;p32"/>
+          <p:cNvPr id="197" name="Google Shape;197;p32"/>
           <p:cNvSpPr txBox="1"/>
           <p:nvPr>
             <p:ph idx="12" type="sldNum"/>
@@ -14125,7 +14099,7 @@
       </p:sp>
       <p:sp>
         <p:nvSpPr>
-          <p:cNvPr id="197" name="Google Shape;197;p32"/>
+          <p:cNvPr id="198" name="Google Shape;198;p32"/>
           <p:cNvSpPr txBox="1"/>
           <p:nvPr>
             <p:ph idx="1" type="body"/>
@@ -14527,7 +14501,7 @@
   <p:cSld>
     <p:spTree>
       <p:nvGrpSpPr>
-        <p:cNvPr id="201" name="Shape 201"/>
+        <p:cNvPr id="202" name="Shape 202"/>
         <p:cNvGrpSpPr/>
         <p:nvPr/>
       </p:nvGrpSpPr>
@@ -14541,7 +14515,7 @@
       </p:grpSpPr>
       <p:sp>
         <p:nvSpPr>
-          <p:cNvPr id="202" name="Google Shape;202;p33"/>
+          <p:cNvPr id="203" name="Google Shape;203;p33"/>
           <p:cNvSpPr txBox="1"/>
           <p:nvPr>
             <p:ph type="title"/>
@@ -14581,7 +14555,7 @@
       </p:sp>
       <p:sp>
         <p:nvSpPr>
-          <p:cNvPr id="203" name="Google Shape;203;p33"/>
+          <p:cNvPr id="204" name="Google Shape;204;p33"/>
           <p:cNvSpPr txBox="1"/>
           <p:nvPr>
             <p:ph idx="12" type="sldNum"/>
@@ -14629,7 +14603,7 @@
       </p:sp>
       <p:pic>
         <p:nvPicPr>
-          <p:cNvPr id="204" name="Google Shape;204;p33"/>
+          <p:cNvPr id="205" name="Google Shape;205;p33"/>
           <p:cNvPicPr preferRelativeResize="0"/>
           <p:nvPr/>
         </p:nvPicPr>
@@ -14668,7 +14642,7 @@
   <p:cSld>
     <p:spTree>
       <p:nvGrpSpPr>
-        <p:cNvPr id="208" name="Shape 208"/>
+        <p:cNvPr id="209" name="Shape 209"/>
         <p:cNvGrpSpPr/>
         <p:nvPr/>
       </p:nvGrpSpPr>
@@ -14682,7 +14656,7 @@
       </p:grpSpPr>
       <p:sp>
         <p:nvSpPr>
-          <p:cNvPr id="209" name="Google Shape;209;p34"/>
+          <p:cNvPr id="210" name="Google Shape;210;p34"/>
           <p:cNvSpPr txBox="1"/>
           <p:nvPr>
             <p:ph type="title"/>
@@ -14722,7 +14696,7 @@
       </p:sp>
       <p:sp>
         <p:nvSpPr>
-          <p:cNvPr id="210" name="Google Shape;210;p34"/>
+          <p:cNvPr id="211" name="Google Shape;211;p34"/>
           <p:cNvSpPr txBox="1"/>
           <p:nvPr>
             <p:ph idx="12" type="sldNum"/>
@@ -14770,7 +14744,7 @@
       </p:sp>
       <p:sp>
         <p:nvSpPr>
-          <p:cNvPr id="211" name="Google Shape;211;p34"/>
+          <p:cNvPr id="212" name="Google Shape;212;p34"/>
           <p:cNvSpPr txBox="1"/>
           <p:nvPr>
             <p:ph idx="1" type="body"/>
@@ -15026,7 +15000,7 @@
   <p:cSld>
     <p:spTree>
       <p:nvGrpSpPr>
-        <p:cNvPr id="215" name="Shape 215"/>
+        <p:cNvPr id="216" name="Shape 216"/>
         <p:cNvGrpSpPr/>
         <p:nvPr/>
       </p:nvGrpSpPr>
@@ -15040,7 +15014,7 @@
       </p:grpSpPr>
       <p:sp>
         <p:nvSpPr>
-          <p:cNvPr id="216" name="Google Shape;216;p35"/>
+          <p:cNvPr id="217" name="Google Shape;217;p35"/>
           <p:cNvSpPr txBox="1"/>
           <p:nvPr>
             <p:ph type="title"/>
@@ -15080,7 +15054,7 @@
       </p:sp>
       <p:sp>
         <p:nvSpPr>
-          <p:cNvPr id="217" name="Google Shape;217;p35"/>
+          <p:cNvPr id="218" name="Google Shape;218;p35"/>
           <p:cNvSpPr txBox="1"/>
           <p:nvPr>
             <p:ph idx="12" type="sldNum"/>
@@ -15128,7 +15102,7 @@
       </p:sp>
       <p:sp>
         <p:nvSpPr>
-          <p:cNvPr id="218" name="Google Shape;218;p35"/>
+          <p:cNvPr id="219" name="Google Shape;219;p35"/>
           <p:cNvSpPr txBox="1"/>
           <p:nvPr>
             <p:ph idx="1" type="body"/>
@@ -15618,7 +15592,7 @@
   <p:cSld>
     <p:spTree>
       <p:nvGrpSpPr>
-        <p:cNvPr id="222" name="Shape 222"/>
+        <p:cNvPr id="223" name="Shape 223"/>
         <p:cNvGrpSpPr/>
         <p:nvPr/>
       </p:nvGrpSpPr>
@@ -15632,7 +15606,7 @@
       </p:grpSpPr>
       <p:sp>
         <p:nvSpPr>
-          <p:cNvPr id="223" name="Google Shape;223;p36"/>
+          <p:cNvPr id="224" name="Google Shape;224;p36"/>
           <p:cNvSpPr txBox="1"/>
           <p:nvPr>
             <p:ph type="title"/>
@@ -15672,7 +15646,7 @@
       </p:sp>
       <p:sp>
         <p:nvSpPr>
-          <p:cNvPr id="224" name="Google Shape;224;p36"/>
+          <p:cNvPr id="225" name="Google Shape;225;p36"/>
           <p:cNvSpPr txBox="1"/>
           <p:nvPr>
             <p:ph idx="12" type="sldNum"/>
@@ -15720,7 +15694,7 @@
       </p:sp>
       <p:sp>
         <p:nvSpPr>
-          <p:cNvPr id="225" name="Google Shape;225;p36"/>
+          <p:cNvPr id="226" name="Google Shape;226;p36"/>
           <p:cNvSpPr txBox="1"/>
           <p:nvPr>
             <p:ph idx="1" type="body"/>
@@ -15969,7 +15943,7 @@
   <p:cSld>
     <p:spTree>
       <p:nvGrpSpPr>
-        <p:cNvPr id="229" name="Shape 229"/>
+        <p:cNvPr id="230" name="Shape 230"/>
         <p:cNvGrpSpPr/>
         <p:nvPr/>
       </p:nvGrpSpPr>
@@ -15983,7 +15957,7 @@
       </p:grpSpPr>
       <p:sp>
         <p:nvSpPr>
-          <p:cNvPr id="230" name="Google Shape;230;p37"/>
+          <p:cNvPr id="231" name="Google Shape;231;p37"/>
           <p:cNvSpPr txBox="1"/>
           <p:nvPr>
             <p:ph type="title"/>
@@ -16014,7 +15988,12 @@
               <a:buNone/>
             </a:pPr>
             <a:r>
-              <a:rPr lang="en"/>
+              <a:rPr lang="en" u="sng">
+                <a:solidFill>
+                  <a:schemeClr val="hlink"/>
+                </a:solidFill>
+                <a:hlinkClick r:id="rId3"/>
+              </a:rPr>
               <a:t>Public-Facing APIs</a:t>
             </a:r>
             <a:endParaRPr/>
@@ -16034,7 +16013,7 @@
   <p:cSld>
     <p:spTree>
       <p:nvGrpSpPr>
-        <p:cNvPr id="234" name="Shape 234"/>
+        <p:cNvPr id="235" name="Shape 235"/>
         <p:cNvGrpSpPr/>
         <p:nvPr/>
       </p:nvGrpSpPr>
@@ -16048,7 +16027,7 @@
       </p:grpSpPr>
       <p:sp>
         <p:nvSpPr>
-          <p:cNvPr id="235" name="Google Shape;235;p38"/>
+          <p:cNvPr id="236" name="Google Shape;236;p38"/>
           <p:cNvSpPr txBox="1"/>
           <p:nvPr>
             <p:ph type="title"/>
@@ -16088,7 +16067,7 @@
       </p:sp>
       <p:sp>
         <p:nvSpPr>
-          <p:cNvPr id="236" name="Google Shape;236;p38"/>
+          <p:cNvPr id="237" name="Google Shape;237;p38"/>
           <p:cNvSpPr txBox="1"/>
           <p:nvPr>
             <p:ph idx="12" type="sldNum"/>
@@ -16136,7 +16115,7 @@
       </p:sp>
       <p:sp>
         <p:nvSpPr>
-          <p:cNvPr id="237" name="Google Shape;237;p38"/>
+          <p:cNvPr id="238" name="Google Shape;238;p38"/>
           <p:cNvSpPr txBox="1"/>
           <p:nvPr>
             <p:ph idx="1" type="body"/>
@@ -16502,7 +16481,7 @@
   <p:cSld>
     <p:spTree>
       <p:nvGrpSpPr>
-        <p:cNvPr id="241" name="Shape 241"/>
+        <p:cNvPr id="242" name="Shape 242"/>
         <p:cNvGrpSpPr/>
         <p:nvPr/>
       </p:nvGrpSpPr>
@@ -16516,7 +16495,7 @@
       </p:grpSpPr>
       <p:sp>
         <p:nvSpPr>
-          <p:cNvPr id="242" name="Google Shape;242;p39"/>
+          <p:cNvPr id="243" name="Google Shape;243;p39"/>
           <p:cNvSpPr txBox="1"/>
           <p:nvPr>
             <p:ph type="title"/>
@@ -16556,7 +16535,7 @@
       </p:sp>
       <p:sp>
         <p:nvSpPr>
-          <p:cNvPr id="243" name="Google Shape;243;p39"/>
+          <p:cNvPr id="244" name="Google Shape;244;p39"/>
           <p:cNvSpPr txBox="1"/>
           <p:nvPr>
             <p:ph idx="1" type="body"/>
@@ -17204,7 +17183,7 @@
       </p:sp>
       <p:sp>
         <p:nvSpPr>
-          <p:cNvPr id="244" name="Google Shape;244;p39"/>
+          <p:cNvPr id="245" name="Google Shape;245;p39"/>
           <p:cNvSpPr txBox="1"/>
           <p:nvPr>
             <p:ph idx="12" type="sldNum"/>
@@ -17263,7 +17242,7 @@
   <p:cSld>
     <p:spTree>
       <p:nvGrpSpPr>
-        <p:cNvPr id="66" name="Shape 66"/>
+        <p:cNvPr id="67" name="Shape 67"/>
         <p:cNvGrpSpPr/>
         <p:nvPr/>
       </p:nvGrpSpPr>
@@ -17277,7 +17256,7 @@
       </p:grpSpPr>
       <p:sp>
         <p:nvSpPr>
-          <p:cNvPr id="67" name="Google Shape;67;p15"/>
+          <p:cNvPr id="68" name="Google Shape;68;p15"/>
           <p:cNvSpPr txBox="1"/>
           <p:nvPr>
             <p:ph type="title"/>
@@ -17328,7 +17307,7 @@
   <p:cSld>
     <p:spTree>
       <p:nvGrpSpPr>
-        <p:cNvPr id="71" name="Shape 71"/>
+        <p:cNvPr id="72" name="Shape 72"/>
         <p:cNvGrpSpPr/>
         <p:nvPr/>
       </p:nvGrpSpPr>
@@ -17342,7 +17321,7 @@
       </p:grpSpPr>
       <p:sp>
         <p:nvSpPr>
-          <p:cNvPr id="72" name="Google Shape;72;p16"/>
+          <p:cNvPr id="73" name="Google Shape;73;p16"/>
           <p:cNvSpPr txBox="1"/>
           <p:nvPr>
             <p:ph type="title"/>
@@ -17382,7 +17361,7 @@
       </p:sp>
       <p:sp>
         <p:nvSpPr>
-          <p:cNvPr id="73" name="Google Shape;73;p16"/>
+          <p:cNvPr id="74" name="Google Shape;74;p16"/>
           <p:cNvSpPr txBox="1"/>
           <p:nvPr>
             <p:ph idx="12" type="sldNum"/>
@@ -17430,7 +17409,7 @@
       </p:sp>
       <p:sp>
         <p:nvSpPr>
-          <p:cNvPr id="74" name="Google Shape;74;p16"/>
+          <p:cNvPr id="75" name="Google Shape;75;p16"/>
           <p:cNvSpPr txBox="1"/>
           <p:nvPr>
             <p:ph idx="1" type="body"/>
@@ -17780,7 +17759,7 @@
   <p:cSld>
     <p:spTree>
       <p:nvGrpSpPr>
-        <p:cNvPr id="78" name="Shape 78"/>
+        <p:cNvPr id="79" name="Shape 79"/>
         <p:cNvGrpSpPr/>
         <p:nvPr/>
       </p:nvGrpSpPr>
@@ -17794,7 +17773,7 @@
       </p:grpSpPr>
       <p:sp>
         <p:nvSpPr>
-          <p:cNvPr id="79" name="Google Shape;79;p17"/>
+          <p:cNvPr id="80" name="Google Shape;80;p17"/>
           <p:cNvSpPr txBox="1"/>
           <p:nvPr>
             <p:ph type="title"/>
@@ -17834,7 +17813,7 @@
       </p:sp>
       <p:sp>
         <p:nvSpPr>
-          <p:cNvPr id="80" name="Google Shape;80;p17"/>
+          <p:cNvPr id="81" name="Google Shape;81;p17"/>
           <p:cNvSpPr txBox="1"/>
           <p:nvPr>
             <p:ph idx="12" type="sldNum"/>
@@ -17882,7 +17861,7 @@
       </p:sp>
       <p:pic>
         <p:nvPicPr>
-          <p:cNvPr id="81" name="Google Shape;81;p17"/>
+          <p:cNvPr id="82" name="Google Shape;82;p17"/>
           <p:cNvPicPr preferRelativeResize="0"/>
           <p:nvPr/>
         </p:nvPicPr>
@@ -17921,7 +17900,7 @@
   <p:cSld>
     <p:spTree>
       <p:nvGrpSpPr>
-        <p:cNvPr id="85" name="Shape 85"/>
+        <p:cNvPr id="86" name="Shape 86"/>
         <p:cNvGrpSpPr/>
         <p:nvPr/>
       </p:nvGrpSpPr>
@@ -17935,7 +17914,7 @@
       </p:grpSpPr>
       <p:sp>
         <p:nvSpPr>
-          <p:cNvPr id="86" name="Google Shape;86;p18"/>
+          <p:cNvPr id="87" name="Google Shape;87;p18"/>
           <p:cNvSpPr txBox="1"/>
           <p:nvPr>
             <p:ph type="title"/>
@@ -17975,7 +17954,7 @@
       </p:sp>
       <p:sp>
         <p:nvSpPr>
-          <p:cNvPr id="87" name="Google Shape;87;p18"/>
+          <p:cNvPr id="88" name="Google Shape;88;p18"/>
           <p:cNvSpPr txBox="1"/>
           <p:nvPr>
             <p:ph idx="12" type="sldNum"/>
@@ -18023,7 +18002,7 @@
       </p:sp>
       <p:sp>
         <p:nvSpPr>
-          <p:cNvPr id="88" name="Google Shape;88;p18"/>
+          <p:cNvPr id="89" name="Google Shape;89;p18"/>
           <p:cNvSpPr txBox="1"/>
           <p:nvPr>
             <p:ph idx="1" type="body"/>
@@ -18239,9 +18218,9 @@
                   <a:schemeClr val="dk1"/>
                 </a:solidFill>
               </a:rPr>
-              <a:t>Bayes’ Theorem</a:t>
-            </a:r>
-            <a:endParaRPr>
+              <a:t>The Noisy Channel Model</a:t>
+            </a:r>
+            <a:endParaRPr b="1">
               <a:solidFill>
                 <a:schemeClr val="dk1"/>
               </a:solidFill>
@@ -18267,43 +18246,7 @@
                   <a:schemeClr val="dk1"/>
                 </a:solidFill>
               </a:rPr>
-              <a:t>P(T | S) = P(Target text given the source text) = P(S | T) * P(T) = P(source given target) * P(target)</a:t>
-            </a:r>
-            <a:endParaRPr>
-              <a:solidFill>
-                <a:schemeClr val="dk1"/>
-              </a:solidFill>
-            </a:endParaRPr>
-          </a:p>
-          <a:p>
-            <a:pPr indent="-317500" lvl="2" marL="1371600" rtl="0" algn="l">
-              <a:spcBef>
-                <a:spcPts val="0"/>
-              </a:spcBef>
-              <a:spcAft>
-                <a:spcPts val="0"/>
-              </a:spcAft>
-              <a:buClr>
-                <a:schemeClr val="dk1"/>
-              </a:buClr>
-              <a:buSzPts val="1400"/>
-              <a:buChar char="■"/>
-            </a:pPr>
-            <a:r>
-              <a:rPr lang="en">
-                <a:solidFill>
-                  <a:schemeClr val="dk1"/>
-                </a:solidFill>
-              </a:rPr>
-              <a:t>This was called </a:t>
-            </a:r>
-            <a:r>
-              <a:rPr i="1" lang="en">
-                <a:solidFill>
-                  <a:schemeClr val="dk1"/>
-                </a:solidFill>
-              </a:rPr>
-              <a:t>The Translation Table</a:t>
+              <a:t>Find the max probability argmax(P(T|S))</a:t>
             </a:r>
             <a:endParaRPr>
               <a:solidFill>
@@ -18331,35 +18274,7 @@
                   <a:schemeClr val="dk1"/>
                 </a:solidFill>
               </a:rPr>
-              <a:t>Also considered things like word-alignment (e.g. “todos los días” -&gt; “every day”) and word reordering</a:t>
-            </a:r>
-            <a:endParaRPr>
-              <a:solidFill>
-                <a:schemeClr val="dk1"/>
-              </a:solidFill>
-            </a:endParaRPr>
-          </a:p>
-          <a:p>
-            <a:pPr indent="-317500" lvl="1" marL="914400" rtl="0" algn="l">
-              <a:spcBef>
-                <a:spcPts val="0"/>
-              </a:spcBef>
-              <a:spcAft>
-                <a:spcPts val="0"/>
-              </a:spcAft>
-              <a:buClr>
-                <a:schemeClr val="dk1"/>
-              </a:buClr>
-              <a:buSzPts val="1400"/>
-              <a:buChar char="○"/>
-            </a:pPr>
-            <a:r>
-              <a:rPr lang="en">
-                <a:solidFill>
-                  <a:schemeClr val="dk1"/>
-                </a:solidFill>
-              </a:rPr>
-              <a:t>All these things were given weight and then considered when producing a translation</a:t>
+              <a:t>You’ll learn more about that next week!</a:t>
             </a:r>
             <a:endParaRPr>
               <a:solidFill>
@@ -18382,7 +18297,7 @@
   <p:cSld>
     <p:spTree>
       <p:nvGrpSpPr>
-        <p:cNvPr id="92" name="Shape 92"/>
+        <p:cNvPr id="93" name="Shape 93"/>
         <p:cNvGrpSpPr/>
         <p:nvPr/>
       </p:nvGrpSpPr>
@@ -18396,7 +18311,7 @@
       </p:grpSpPr>
       <p:sp>
         <p:nvSpPr>
-          <p:cNvPr id="93" name="Google Shape;93;p19"/>
+          <p:cNvPr id="94" name="Google Shape;94;p19"/>
           <p:cNvSpPr txBox="1"/>
           <p:nvPr>
             <p:ph type="title"/>
@@ -18436,7 +18351,7 @@
       </p:sp>
       <p:sp>
         <p:nvSpPr>
-          <p:cNvPr id="94" name="Google Shape;94;p19"/>
+          <p:cNvPr id="95" name="Google Shape;95;p19"/>
           <p:cNvSpPr txBox="1"/>
           <p:nvPr>
             <p:ph idx="12" type="sldNum"/>
@@ -18484,7 +18399,7 @@
       </p:sp>
       <p:sp>
         <p:nvSpPr>
-          <p:cNvPr id="95" name="Google Shape;95;p19"/>
+          <p:cNvPr id="96" name="Google Shape;96;p19"/>
           <p:cNvSpPr txBox="1"/>
           <p:nvPr>
             <p:ph idx="1" type="body"/>
@@ -18813,7 +18728,7 @@
   <p:cSld>
     <p:spTree>
       <p:nvGrpSpPr>
-        <p:cNvPr id="99" name="Shape 99"/>
+        <p:cNvPr id="100" name="Shape 100"/>
         <p:cNvGrpSpPr/>
         <p:nvPr/>
       </p:nvGrpSpPr>
@@ -18827,7 +18742,7 @@
       </p:grpSpPr>
       <p:sp>
         <p:nvSpPr>
-          <p:cNvPr id="100" name="Google Shape;100;p20"/>
+          <p:cNvPr id="101" name="Google Shape;101;p20"/>
           <p:cNvSpPr txBox="1"/>
           <p:nvPr>
             <p:ph type="title"/>
@@ -18878,7 +18793,7 @@
   <p:cSld>
     <p:spTree>
       <p:nvGrpSpPr>
-        <p:cNvPr id="104" name="Shape 104"/>
+        <p:cNvPr id="105" name="Shape 105"/>
         <p:cNvGrpSpPr/>
         <p:nvPr/>
       </p:nvGrpSpPr>
@@ -18892,7 +18807,7 @@
       </p:grpSpPr>
       <p:sp>
         <p:nvSpPr>
-          <p:cNvPr id="105" name="Google Shape;105;p21"/>
+          <p:cNvPr id="106" name="Google Shape;106;p21"/>
           <p:cNvSpPr txBox="1"/>
           <p:nvPr>
             <p:ph type="title"/>
@@ -18932,7 +18847,7 @@
       </p:sp>
       <p:sp>
         <p:nvSpPr>
-          <p:cNvPr id="106" name="Google Shape;106;p21"/>
+          <p:cNvPr id="107" name="Google Shape;107;p21"/>
           <p:cNvSpPr txBox="1"/>
           <p:nvPr>
             <p:ph idx="12" type="sldNum"/>
@@ -18980,7 +18895,7 @@
       </p:sp>
       <p:sp>
         <p:nvSpPr>
-          <p:cNvPr id="107" name="Google Shape;107;p21"/>
+          <p:cNvPr id="108" name="Google Shape;108;p21"/>
           <p:cNvSpPr txBox="1"/>
           <p:nvPr>
             <p:ph idx="1" type="body"/>
@@ -19230,7 +19145,7 @@
       </p:sp>
       <p:pic>
         <p:nvPicPr>
-          <p:cNvPr id="108" name="Google Shape;108;p21"/>
+          <p:cNvPr id="109" name="Google Shape;109;p21"/>
           <p:cNvPicPr preferRelativeResize="0"/>
           <p:nvPr/>
         </p:nvPicPr>
@@ -19257,7 +19172,7 @@
       </p:pic>
       <p:cxnSp>
         <p:nvCxnSpPr>
-          <p:cNvPr id="109" name="Google Shape;109;p21"/>
+          <p:cNvPr id="110" name="Google Shape;110;p21"/>
           <p:cNvCxnSpPr/>
           <p:nvPr/>
         </p:nvCxnSpPr>
@@ -19283,7 +19198,7 @@
       </p:cxnSp>
       <p:sp>
         <p:nvSpPr>
-          <p:cNvPr id="110" name="Google Shape;110;p21"/>
+          <p:cNvPr id="111" name="Google Shape;111;p21"/>
           <p:cNvSpPr txBox="1"/>
           <p:nvPr/>
         </p:nvSpPr>
@@ -19333,7 +19248,7 @@
       </p:sp>
       <p:cxnSp>
         <p:nvCxnSpPr>
-          <p:cNvPr id="111" name="Google Shape;111;p21"/>
+          <p:cNvPr id="112" name="Google Shape;112;p21"/>
           <p:cNvCxnSpPr/>
           <p:nvPr/>
         </p:nvCxnSpPr>
@@ -19359,7 +19274,7 @@
       </p:cxnSp>
       <p:sp>
         <p:nvSpPr>
-          <p:cNvPr id="112" name="Google Shape;112;p21"/>
+          <p:cNvPr id="113" name="Google Shape;113;p21"/>
           <p:cNvSpPr txBox="1"/>
           <p:nvPr/>
         </p:nvSpPr>
@@ -19425,7 +19340,7 @@
       </p:sp>
       <p:pic>
         <p:nvPicPr>
-          <p:cNvPr id="113" name="Google Shape;113;p21"/>
+          <p:cNvPr id="114" name="Google Shape;114;p21"/>
           <p:cNvPicPr preferRelativeResize="0"/>
           <p:nvPr/>
         </p:nvPicPr>
@@ -19453,7 +19368,7 @@
       </p:pic>
       <p:pic>
         <p:nvPicPr>
-          <p:cNvPr id="114" name="Google Shape;114;p21"/>
+          <p:cNvPr id="115" name="Google Shape;115;p21"/>
           <p:cNvPicPr preferRelativeResize="0"/>
           <p:nvPr/>
         </p:nvPicPr>
@@ -19488,6 +19403,285 @@
 </file>
 
 <file path=ppt/theme/theme1.xml><?xml version="1.0" encoding="utf-8"?>
+<a:theme xmlns:a="http://schemas.openxmlformats.org/drawingml/2006/main" xmlns:r="http://schemas.openxmlformats.org/officeDocument/2006/relationships">
+  <a:themeElements>
+    <a:clrScheme name="Default">
+      <a:dk1>
+        <a:srgbClr val="000000"/>
+      </a:dk1>
+      <a:lt1>
+        <a:srgbClr val="FFFFFF"/>
+      </a:lt1>
+      <a:dk2>
+        <a:srgbClr val="158158"/>
+      </a:dk2>
+      <a:lt2>
+        <a:srgbClr val="F3F3F3"/>
+      </a:lt2>
+      <a:accent1>
+        <a:srgbClr val="058DC7"/>
+      </a:accent1>
+      <a:accent2>
+        <a:srgbClr val="50B432"/>
+      </a:accent2>
+      <a:accent3>
+        <a:srgbClr val="ED561B"/>
+      </a:accent3>
+      <a:accent4>
+        <a:srgbClr val="EDEF00"/>
+      </a:accent4>
+      <a:accent5>
+        <a:srgbClr val="24CBE5"/>
+      </a:accent5>
+      <a:accent6>
+        <a:srgbClr val="64E572"/>
+      </a:accent6>
+      <a:hlink>
+        <a:srgbClr val="2200CC"/>
+      </a:hlink>
+      <a:folHlink>
+        <a:srgbClr val="551A8B"/>
+      </a:folHlink>
+    </a:clrScheme>
+    <a:fontScheme name="Office">
+      <a:majorFont>
+        <a:latin typeface="Arial"/>
+        <a:ea typeface=""/>
+        <a:cs typeface=""/>
+        <a:font script="Jpan" typeface="ＭＳ Ｐゴシック"/>
+        <a:font script="Hang" typeface="맑은 고딕"/>
+        <a:font script="Hans" typeface="宋体"/>
+        <a:font script="Hant" typeface="新細明體"/>
+        <a:font script="Arab" typeface="Times New Roman"/>
+        <a:font script="Hebr" typeface="Times New Roman"/>
+        <a:font script="Thai" typeface="Angsana New"/>
+        <a:font script="Ethi" typeface="Nyala"/>
+        <a:font script="Beng" typeface="Vrinda"/>
+        <a:font script="Gujr" typeface="Shruti"/>
+        <a:font script="Khmr" typeface="MoolBoran"/>
+        <a:font script="Knda" typeface="Tunga"/>
+        <a:font script="Guru" typeface="Raavi"/>
+        <a:font script="Cans" typeface="Euphemia"/>
+        <a:font script="Cher" typeface="Plantagenet Cherokee"/>
+        <a:font script="Yiii" typeface="Microsoft Yi Baiti"/>
+        <a:font script="Tibt" typeface="Microsoft Himalaya"/>
+        <a:font script="Thaa" typeface="MV Boli"/>
+        <a:font script="Deva" typeface="Mangal"/>
+        <a:font script="Telu" typeface="Gautami"/>
+        <a:font script="Taml" typeface="Latha"/>
+        <a:font script="Syrc" typeface="Estrangelo Edessa"/>
+        <a:font script="Orya" typeface="Kalinga"/>
+        <a:font script="Mlym" typeface="Kartika"/>
+        <a:font script="Laoo" typeface="DokChampa"/>
+        <a:font script="Sinh" typeface="Iskoola Pota"/>
+        <a:font script="Mong" typeface="Mongolian Baiti"/>
+        <a:font script="Viet" typeface="Times New Roman"/>
+        <a:font script="Uigh" typeface="Microsoft Uighur"/>
+        <a:font script="Geor" typeface="Sylfaen"/>
+      </a:majorFont>
+      <a:minorFont>
+        <a:latin typeface="Arial"/>
+        <a:ea typeface=""/>
+        <a:cs typeface=""/>
+        <a:font script="Jpan" typeface="ＭＳ Ｐゴシック"/>
+        <a:font script="Hang" typeface="맑은 고딕"/>
+        <a:font script="Hans" typeface="宋体"/>
+        <a:font script="Hant" typeface="新細明體"/>
+        <a:font script="Arab" typeface="Arial"/>
+        <a:font script="Hebr" typeface="Arial"/>
+        <a:font script="Thai" typeface="Cordia New"/>
+        <a:font script="Ethi" typeface="Nyala"/>
+        <a:font script="Beng" typeface="Vrinda"/>
+        <a:font script="Gujr" typeface="Shruti"/>
+        <a:font script="Khmr" typeface="DaunPenh"/>
+        <a:font script="Knda" typeface="Tunga"/>
+        <a:font script="Guru" typeface="Raavi"/>
+        <a:font script="Cans" typeface="Euphemia"/>
+        <a:font script="Cher" typeface="Plantagenet Cherokee"/>
+        <a:font script="Yiii" typeface="Microsoft Yi Baiti"/>
+        <a:font script="Tibt" typeface="Microsoft Himalaya"/>
+        <a:font script="Thaa" typeface="MV Boli"/>
+        <a:font script="Deva" typeface="Mangal"/>
+        <a:font script="Telu" typeface="Gautami"/>
+        <a:font script="Taml" typeface="Latha"/>
+        <a:font script="Syrc" typeface="Estrangelo Edessa"/>
+        <a:font script="Orya" typeface="Kalinga"/>
+        <a:font script="Mlym" typeface="Kartika"/>
+        <a:font script="Laoo" typeface="DokChampa"/>
+        <a:font script="Sinh" typeface="Iskoola Pota"/>
+        <a:font script="Mong" typeface="Mongolian Baiti"/>
+        <a:font script="Viet" typeface="Arial"/>
+        <a:font script="Uigh" typeface="Microsoft Uighur"/>
+        <a:font script="Geor" typeface="Sylfaen"/>
+      </a:minorFont>
+    </a:fontScheme>
+    <a:fmtScheme name="Office">
+      <a:fillStyleLst>
+        <a:solidFill>
+          <a:schemeClr val="phClr"/>
+        </a:solidFill>
+        <a:gradFill rotWithShape="1">
+          <a:gsLst>
+            <a:gs pos="0">
+              <a:schemeClr val="phClr">
+                <a:tint val="50000"/>
+                <a:satMod val="300000"/>
+              </a:schemeClr>
+            </a:gs>
+            <a:gs pos="35000">
+              <a:schemeClr val="phClr">
+                <a:tint val="37000"/>
+                <a:satMod val="300000"/>
+              </a:schemeClr>
+            </a:gs>
+            <a:gs pos="100000">
+              <a:schemeClr val="phClr">
+                <a:tint val="15000"/>
+                <a:satMod val="350000"/>
+              </a:schemeClr>
+            </a:gs>
+          </a:gsLst>
+          <a:lin ang="16200000" scaled="1"/>
+        </a:gradFill>
+        <a:gradFill rotWithShape="1">
+          <a:gsLst>
+            <a:gs pos="0">
+              <a:schemeClr val="phClr">
+                <a:tint val="100000"/>
+                <a:shade val="100000"/>
+                <a:satMod val="130000"/>
+              </a:schemeClr>
+            </a:gs>
+            <a:gs pos="100000">
+              <a:schemeClr val="phClr">
+                <a:tint val="50000"/>
+                <a:shade val="100000"/>
+                <a:satMod val="350000"/>
+              </a:schemeClr>
+            </a:gs>
+          </a:gsLst>
+          <a:lin ang="16200000" scaled="0"/>
+        </a:gradFill>
+      </a:fillStyleLst>
+      <a:lnStyleLst>
+        <a:ln w="9525" cap="flat" cmpd="sng" algn="ctr">
+          <a:solidFill>
+            <a:schemeClr val="phClr">
+              <a:shade val="95000"/>
+              <a:satMod val="105000"/>
+            </a:schemeClr>
+          </a:solidFill>
+          <a:prstDash val="solid"/>
+        </a:ln>
+        <a:ln w="25400" cap="flat" cmpd="sng" algn="ctr">
+          <a:solidFill>
+            <a:schemeClr val="phClr"/>
+          </a:solidFill>
+          <a:prstDash val="solid"/>
+        </a:ln>
+        <a:ln w="38100" cap="flat" cmpd="sng" algn="ctr">
+          <a:solidFill>
+            <a:schemeClr val="phClr"/>
+          </a:solidFill>
+          <a:prstDash val="solid"/>
+        </a:ln>
+      </a:lnStyleLst>
+      <a:effectStyleLst>
+        <a:effectStyle>
+          <a:effectLst>
+            <a:outerShdw blurRad="40000" dist="20000" dir="5400000" rotWithShape="0">
+              <a:srgbClr val="000000">
+                <a:alpha val="38000"/>
+              </a:srgbClr>
+            </a:outerShdw>
+          </a:effectLst>
+        </a:effectStyle>
+        <a:effectStyle>
+          <a:effectLst>
+            <a:outerShdw blurRad="40000" dist="23000" dir="5400000" rotWithShape="0">
+              <a:srgbClr val="000000">
+                <a:alpha val="35000"/>
+              </a:srgbClr>
+            </a:outerShdw>
+          </a:effectLst>
+        </a:effectStyle>
+        <a:effectStyle>
+          <a:effectLst>
+            <a:outerShdw blurRad="40000" dist="23000" dir="5400000" rotWithShape="0">
+              <a:srgbClr val="000000">
+                <a:alpha val="35000"/>
+              </a:srgbClr>
+            </a:outerShdw>
+          </a:effectLst>
+          <a:scene3d>
+            <a:camera prst="orthographicFront">
+              <a:rot lat="0" lon="0" rev="0"/>
+            </a:camera>
+            <a:lightRig rig="threePt" dir="t">
+              <a:rot lat="0" lon="0" rev="1200000"/>
+            </a:lightRig>
+          </a:scene3d>
+          <a:sp3d>
+            <a:bevelT w="63500" h="25400"/>
+          </a:sp3d>
+        </a:effectStyle>
+      </a:effectStyleLst>
+      <a:bgFillStyleLst>
+        <a:solidFill>
+          <a:schemeClr val="phClr"/>
+        </a:solidFill>
+        <a:gradFill rotWithShape="1">
+          <a:gsLst>
+            <a:gs pos="0">
+              <a:schemeClr val="phClr">
+                <a:tint val="40000"/>
+                <a:satMod val="350000"/>
+              </a:schemeClr>
+            </a:gs>
+            <a:gs pos="40000">
+              <a:schemeClr val="phClr">
+                <a:tint val="45000"/>
+                <a:shade val="99000"/>
+                <a:satMod val="350000"/>
+              </a:schemeClr>
+            </a:gs>
+            <a:gs pos="100000">
+              <a:schemeClr val="phClr">
+                <a:shade val="20000"/>
+                <a:satMod val="255000"/>
+              </a:schemeClr>
+            </a:gs>
+          </a:gsLst>
+          <a:path path="circle">
+            <a:fillToRect l="50000" t="-80000" r="50000" b="180000"/>
+          </a:path>
+        </a:gradFill>
+        <a:gradFill rotWithShape="1">
+          <a:gsLst>
+            <a:gs pos="0">
+              <a:schemeClr val="phClr">
+                <a:tint val="80000"/>
+                <a:satMod val="300000"/>
+              </a:schemeClr>
+            </a:gs>
+            <a:gs pos="100000">
+              <a:schemeClr val="phClr">
+                <a:shade val="30000"/>
+                <a:satMod val="200000"/>
+              </a:schemeClr>
+            </a:gs>
+          </a:gsLst>
+          <a:path path="circle">
+            <a:fillToRect l="50000" t="50000" r="50000" b="50000"/>
+          </a:path>
+        </a:gradFill>
+      </a:bgFillStyleLst>
+    </a:fmtScheme>
+  </a:themeElements>
+</a:theme>
+</file>
+
+<file path=ppt/theme/theme2.xml><?xml version="1.0" encoding="utf-8"?>
 <a:theme xmlns:a="http://schemas.openxmlformats.org/drawingml/2006/main" xmlns:r="http://schemas.openxmlformats.org/officeDocument/2006/relationships" name="Simple Dark">
   <a:themeElements>
     <a:clrScheme name="Simple Dark">
@@ -19764,283 +19958,4 @@
     </a:fmtScheme>
   </a:themeElements>
 </a:theme>
-</file>
-
-<file path=ppt/theme/theme2.xml><?xml version="1.0" encoding="utf-8"?>
-<a:theme xmlns:a="http://schemas.openxmlformats.org/drawingml/2006/main" xmlns:r="http://schemas.openxmlformats.org/officeDocument/2006/relationships">
-  <a:themeElements>
-    <a:clrScheme name="Default">
-      <a:dk1>
-        <a:srgbClr val="000000"/>
-      </a:dk1>
-      <a:lt1>
-        <a:srgbClr val="FFFFFF"/>
-      </a:lt1>
-      <a:dk2>
-        <a:srgbClr val="158158"/>
-      </a:dk2>
-      <a:lt2>
-        <a:srgbClr val="F3F3F3"/>
-      </a:lt2>
-      <a:accent1>
-        <a:srgbClr val="058DC7"/>
-      </a:accent1>
-      <a:accent2>
-        <a:srgbClr val="50B432"/>
-      </a:accent2>
-      <a:accent3>
-        <a:srgbClr val="ED561B"/>
-      </a:accent3>
-      <a:accent4>
-        <a:srgbClr val="EDEF00"/>
-      </a:accent4>
-      <a:accent5>
-        <a:srgbClr val="24CBE5"/>
-      </a:accent5>
-      <a:accent6>
-        <a:srgbClr val="64E572"/>
-      </a:accent6>
-      <a:hlink>
-        <a:srgbClr val="2200CC"/>
-      </a:hlink>
-      <a:folHlink>
-        <a:srgbClr val="551A8B"/>
-      </a:folHlink>
-    </a:clrScheme>
-    <a:fontScheme name="Office">
-      <a:majorFont>
-        <a:latin typeface="Arial"/>
-        <a:ea typeface=""/>
-        <a:cs typeface=""/>
-        <a:font script="Jpan" typeface="ＭＳ Ｐゴシック"/>
-        <a:font script="Hang" typeface="맑은 고딕"/>
-        <a:font script="Hans" typeface="宋体"/>
-        <a:font script="Hant" typeface="新細明體"/>
-        <a:font script="Arab" typeface="Times New Roman"/>
-        <a:font script="Hebr" typeface="Times New Roman"/>
-        <a:font script="Thai" typeface="Angsana New"/>
-        <a:font script="Ethi" typeface="Nyala"/>
-        <a:font script="Beng" typeface="Vrinda"/>
-        <a:font script="Gujr" typeface="Shruti"/>
-        <a:font script="Khmr" typeface="MoolBoran"/>
-        <a:font script="Knda" typeface="Tunga"/>
-        <a:font script="Guru" typeface="Raavi"/>
-        <a:font script="Cans" typeface="Euphemia"/>
-        <a:font script="Cher" typeface="Plantagenet Cherokee"/>
-        <a:font script="Yiii" typeface="Microsoft Yi Baiti"/>
-        <a:font script="Tibt" typeface="Microsoft Himalaya"/>
-        <a:font script="Thaa" typeface="MV Boli"/>
-        <a:font script="Deva" typeface="Mangal"/>
-        <a:font script="Telu" typeface="Gautami"/>
-        <a:font script="Taml" typeface="Latha"/>
-        <a:font script="Syrc" typeface="Estrangelo Edessa"/>
-        <a:font script="Orya" typeface="Kalinga"/>
-        <a:font script="Mlym" typeface="Kartika"/>
-        <a:font script="Laoo" typeface="DokChampa"/>
-        <a:font script="Sinh" typeface="Iskoola Pota"/>
-        <a:font script="Mong" typeface="Mongolian Baiti"/>
-        <a:font script="Viet" typeface="Times New Roman"/>
-        <a:font script="Uigh" typeface="Microsoft Uighur"/>
-        <a:font script="Geor" typeface="Sylfaen"/>
-      </a:majorFont>
-      <a:minorFont>
-        <a:latin typeface="Arial"/>
-        <a:ea typeface=""/>
-        <a:cs typeface=""/>
-        <a:font script="Jpan" typeface="ＭＳ Ｐゴシック"/>
-        <a:font script="Hang" typeface="맑은 고딕"/>
-        <a:font script="Hans" typeface="宋体"/>
-        <a:font script="Hant" typeface="新細明體"/>
-        <a:font script="Arab" typeface="Arial"/>
-        <a:font script="Hebr" typeface="Arial"/>
-        <a:font script="Thai" typeface="Cordia New"/>
-        <a:font script="Ethi" typeface="Nyala"/>
-        <a:font script="Beng" typeface="Vrinda"/>
-        <a:font script="Gujr" typeface="Shruti"/>
-        <a:font script="Khmr" typeface="DaunPenh"/>
-        <a:font script="Knda" typeface="Tunga"/>
-        <a:font script="Guru" typeface="Raavi"/>
-        <a:font script="Cans" typeface="Euphemia"/>
-        <a:font script="Cher" typeface="Plantagenet Cherokee"/>
-        <a:font script="Yiii" typeface="Microsoft Yi Baiti"/>
-        <a:font script="Tibt" typeface="Microsoft Himalaya"/>
-        <a:font script="Thaa" typeface="MV Boli"/>
-        <a:font script="Deva" typeface="Mangal"/>
-        <a:font script="Telu" typeface="Gautami"/>
-        <a:font script="Taml" typeface="Latha"/>
-        <a:font script="Syrc" typeface="Estrangelo Edessa"/>
-        <a:font script="Orya" typeface="Kalinga"/>
-        <a:font script="Mlym" typeface="Kartika"/>
-        <a:font script="Laoo" typeface="DokChampa"/>
-        <a:font script="Sinh" typeface="Iskoola Pota"/>
-        <a:font script="Mong" typeface="Mongolian Baiti"/>
-        <a:font script="Viet" typeface="Arial"/>
-        <a:font script="Uigh" typeface="Microsoft Uighur"/>
-        <a:font script="Geor" typeface="Sylfaen"/>
-      </a:minorFont>
-    </a:fontScheme>
-    <a:fmtScheme name="Office">
-      <a:fillStyleLst>
-        <a:solidFill>
-          <a:schemeClr val="phClr"/>
-        </a:solidFill>
-        <a:gradFill rotWithShape="1">
-          <a:gsLst>
-            <a:gs pos="0">
-              <a:schemeClr val="phClr">
-                <a:tint val="50000"/>
-                <a:satMod val="300000"/>
-              </a:schemeClr>
-            </a:gs>
-            <a:gs pos="35000">
-              <a:schemeClr val="phClr">
-                <a:tint val="37000"/>
-                <a:satMod val="300000"/>
-              </a:schemeClr>
-            </a:gs>
-            <a:gs pos="100000">
-              <a:schemeClr val="phClr">
-                <a:tint val="15000"/>
-                <a:satMod val="350000"/>
-              </a:schemeClr>
-            </a:gs>
-          </a:gsLst>
-          <a:lin ang="16200000" scaled="1"/>
-        </a:gradFill>
-        <a:gradFill rotWithShape="1">
-          <a:gsLst>
-            <a:gs pos="0">
-              <a:schemeClr val="phClr">
-                <a:tint val="100000"/>
-                <a:shade val="100000"/>
-                <a:satMod val="130000"/>
-              </a:schemeClr>
-            </a:gs>
-            <a:gs pos="100000">
-              <a:schemeClr val="phClr">
-                <a:tint val="50000"/>
-                <a:shade val="100000"/>
-                <a:satMod val="350000"/>
-              </a:schemeClr>
-            </a:gs>
-          </a:gsLst>
-          <a:lin ang="16200000" scaled="0"/>
-        </a:gradFill>
-      </a:fillStyleLst>
-      <a:lnStyleLst>
-        <a:ln w="9525" cap="flat" cmpd="sng" algn="ctr">
-          <a:solidFill>
-            <a:schemeClr val="phClr">
-              <a:shade val="95000"/>
-              <a:satMod val="105000"/>
-            </a:schemeClr>
-          </a:solidFill>
-          <a:prstDash val="solid"/>
-        </a:ln>
-        <a:ln w="25400" cap="flat" cmpd="sng" algn="ctr">
-          <a:solidFill>
-            <a:schemeClr val="phClr"/>
-          </a:solidFill>
-          <a:prstDash val="solid"/>
-        </a:ln>
-        <a:ln w="38100" cap="flat" cmpd="sng" algn="ctr">
-          <a:solidFill>
-            <a:schemeClr val="phClr"/>
-          </a:solidFill>
-          <a:prstDash val="solid"/>
-        </a:ln>
-      </a:lnStyleLst>
-      <a:effectStyleLst>
-        <a:effectStyle>
-          <a:effectLst>
-            <a:outerShdw blurRad="40000" dist="20000" dir="5400000" rotWithShape="0">
-              <a:srgbClr val="000000">
-                <a:alpha val="38000"/>
-              </a:srgbClr>
-            </a:outerShdw>
-          </a:effectLst>
-        </a:effectStyle>
-        <a:effectStyle>
-          <a:effectLst>
-            <a:outerShdw blurRad="40000" dist="23000" dir="5400000" rotWithShape="0">
-              <a:srgbClr val="000000">
-                <a:alpha val="35000"/>
-              </a:srgbClr>
-            </a:outerShdw>
-          </a:effectLst>
-        </a:effectStyle>
-        <a:effectStyle>
-          <a:effectLst>
-            <a:outerShdw blurRad="40000" dist="23000" dir="5400000" rotWithShape="0">
-              <a:srgbClr val="000000">
-                <a:alpha val="35000"/>
-              </a:srgbClr>
-            </a:outerShdw>
-          </a:effectLst>
-          <a:scene3d>
-            <a:camera prst="orthographicFront">
-              <a:rot lat="0" lon="0" rev="0"/>
-            </a:camera>
-            <a:lightRig rig="threePt" dir="t">
-              <a:rot lat="0" lon="0" rev="1200000"/>
-            </a:lightRig>
-          </a:scene3d>
-          <a:sp3d>
-            <a:bevelT w="63500" h="25400"/>
-          </a:sp3d>
-        </a:effectStyle>
-      </a:effectStyleLst>
-      <a:bgFillStyleLst>
-        <a:solidFill>
-          <a:schemeClr val="phClr"/>
-        </a:solidFill>
-        <a:gradFill rotWithShape="1">
-          <a:gsLst>
-            <a:gs pos="0">
-              <a:schemeClr val="phClr">
-                <a:tint val="40000"/>
-                <a:satMod val="350000"/>
-              </a:schemeClr>
-            </a:gs>
-            <a:gs pos="40000">
-              <a:schemeClr val="phClr">
-                <a:tint val="45000"/>
-                <a:shade val="99000"/>
-                <a:satMod val="350000"/>
-              </a:schemeClr>
-            </a:gs>
-            <a:gs pos="100000">
-              <a:schemeClr val="phClr">
-                <a:shade val="20000"/>
-                <a:satMod val="255000"/>
-              </a:schemeClr>
-            </a:gs>
-          </a:gsLst>
-          <a:path path="circle">
-            <a:fillToRect l="50000" t="-80000" r="50000" b="180000"/>
-          </a:path>
-        </a:gradFill>
-        <a:gradFill rotWithShape="1">
-          <a:gsLst>
-            <a:gs pos="0">
-              <a:schemeClr val="phClr">
-                <a:tint val="80000"/>
-                <a:satMod val="300000"/>
-              </a:schemeClr>
-            </a:gs>
-            <a:gs pos="100000">
-              <a:schemeClr val="phClr">
-                <a:shade val="30000"/>
-                <a:satMod val="200000"/>
-              </a:schemeClr>
-            </a:gs>
-          </a:gsLst>
-          <a:path path="circle">
-            <a:fillToRect l="50000" t="50000" r="50000" b="50000"/>
-          </a:path>
-        </a:gradFill>
-      </a:bgFillStyleLst>
-    </a:fmtScheme>
-  </a:themeElements>
-</a:theme>
 </file>
</xml_diff>